<commit_message>
file da thay doi
</commit_message>
<xml_diff>
--- a/GIT-AND-GITHUB.pptx
+++ b/GIT-AND-GITHUB.pptx
@@ -5,20 +5,21 @@
     <p:sldMasterId id="2147483816" r:id="rId1"/>
   </p:sldMasterIdLst>
   <p:notesMasterIdLst>
-    <p:notesMasterId r:id="rId13"/>
+    <p:notesMasterId r:id="rId14"/>
   </p:notesMasterIdLst>
   <p:sldIdLst>
     <p:sldId id="256" r:id="rId2"/>
-    <p:sldId id="257" r:id="rId3"/>
-    <p:sldId id="258" r:id="rId4"/>
-    <p:sldId id="269" r:id="rId5"/>
-    <p:sldId id="259" r:id="rId6"/>
-    <p:sldId id="261" r:id="rId7"/>
-    <p:sldId id="268" r:id="rId8"/>
-    <p:sldId id="262" r:id="rId9"/>
-    <p:sldId id="265" r:id="rId10"/>
-    <p:sldId id="266" r:id="rId11"/>
-    <p:sldId id="267" r:id="rId12"/>
+    <p:sldId id="270" r:id="rId3"/>
+    <p:sldId id="257" r:id="rId4"/>
+    <p:sldId id="258" r:id="rId5"/>
+    <p:sldId id="269" r:id="rId6"/>
+    <p:sldId id="259" r:id="rId7"/>
+    <p:sldId id="261" r:id="rId8"/>
+    <p:sldId id="268" r:id="rId9"/>
+    <p:sldId id="262" r:id="rId10"/>
+    <p:sldId id="265" r:id="rId11"/>
+    <p:sldId id="266" r:id="rId12"/>
+    <p:sldId id="267" r:id="rId13"/>
   </p:sldIdLst>
   <p:sldSz cx="9144000" cy="6858000" type="screen4x3"/>
   <p:notesSz cx="6858000" cy="9144000"/>
@@ -119,7 +120,7 @@
   </p:defaultTextStyle>
   <p:extLst>
     <p:ext uri="{EFAFB233-063F-42B5-8137-9DF3F51BA10A}">
-      <p15:sldGuideLst xmlns:p15="http://schemas.microsoft.com/office/powerpoint/2012/main" xmlns="">
+      <p15:sldGuideLst xmlns="" xmlns:p15="http://schemas.microsoft.com/office/powerpoint/2012/main">
         <p15:guide id="1" orient="horz" pos="2160">
           <p15:clr>
             <a:srgbClr val="A4A3A4"/>
@@ -555,7 +556,7 @@
           <a:p>
             <a:fld id="{EEA66583-89BE-41AC-9A97-462FFAC4CDC9}" type="slidenum">
               <a:rPr lang="en-US" smtClean="0"/>
-              <a:t>11</a:t>
+              <a:t>12</a:t>
             </a:fld>
             <a:endParaRPr lang="en-US"/>
           </a:p>
@@ -5219,10 +5220,786 @@
       </p:grpSpPr>
       <p:sp>
         <p:nvSpPr>
+          <p:cNvPr id="2" name="Rounded Rectangle 7">
+            <a:extLst>
+              <a:ext uri="{FF2B5EF4-FFF2-40B4-BE49-F238E27FC236}">
+                <a16:creationId xmlns="" xmlns:a16="http://schemas.microsoft.com/office/drawing/2014/main" id="{509CC8F0-9BCC-4C53-9CE1-463CC7B19C06}"/>
+              </a:ext>
+            </a:extLst>
+          </p:cNvPr>
+          <p:cNvSpPr/>
+          <p:nvPr/>
+        </p:nvSpPr>
+        <p:spPr>
+          <a:xfrm>
+            <a:off x="152400" y="169398"/>
+            <a:ext cx="5181600" cy="533400"/>
+          </a:xfrm>
+          <a:prstGeom prst="roundRect">
+            <a:avLst/>
+          </a:prstGeom>
+          <a:solidFill>
+            <a:schemeClr val="accent2">
+              <a:lumMod val="20000"/>
+              <a:lumOff val="80000"/>
+            </a:schemeClr>
+          </a:solidFill>
+          <a:ln>
+            <a:solidFill>
+              <a:schemeClr val="tx2"/>
+            </a:solidFill>
+          </a:ln>
+        </p:spPr>
+        <p:style>
+          <a:lnRef idx="2">
+            <a:schemeClr val="accent1">
+              <a:shade val="50000"/>
+            </a:schemeClr>
+          </a:lnRef>
+          <a:fillRef idx="1">
+            <a:schemeClr val="accent1"/>
+          </a:fillRef>
+          <a:effectRef idx="0">
+            <a:schemeClr val="accent1"/>
+          </a:effectRef>
+          <a:fontRef idx="minor">
+            <a:schemeClr val="lt1"/>
+          </a:fontRef>
+        </p:style>
+        <p:txBody>
+          <a:bodyPr rtlCol="0" anchor="ctr"/>
+          <a:lstStyle/>
+          <a:p>
+            <a:pPr algn="ctr"/>
+            <a:r>
+              <a:rPr lang="en-US" dirty="0">
+                <a:solidFill>
+                  <a:schemeClr val="tx1"/>
+                </a:solidFill>
+                <a:latin typeface="Times New Roman" pitchFamily="18" charset="0"/>
+                <a:cs typeface="Times New Roman" pitchFamily="18" charset="0"/>
+              </a:rPr>
+              <a:t>H</a:t>
+            </a:r>
+            <a:r>
+              <a:rPr lang="vi-VN" dirty="0">
+                <a:solidFill>
+                  <a:schemeClr val="tx1"/>
+                </a:solidFill>
+                <a:latin typeface="Times New Roman" pitchFamily="18" charset="0"/>
+                <a:cs typeface="Times New Roman" pitchFamily="18" charset="0"/>
+              </a:rPr>
+              <a:t>Ư</a:t>
+            </a:r>
+            <a:r>
+              <a:rPr lang="en-US" dirty="0">
+                <a:solidFill>
+                  <a:schemeClr val="tx1"/>
+                </a:solidFill>
+                <a:latin typeface="Times New Roman" pitchFamily="18" charset="0"/>
+                <a:cs typeface="Times New Roman" pitchFamily="18" charset="0"/>
+              </a:rPr>
+              <a:t>ỚNG DẪN SỬ DỤNG  </a:t>
+            </a:r>
+          </a:p>
+        </p:txBody>
+      </p:sp>
+      <p:sp>
+        <p:nvSpPr>
+          <p:cNvPr id="3" name="Rectangle: Rounded Corners 2">
+            <a:extLst>
+              <a:ext uri="{FF2B5EF4-FFF2-40B4-BE49-F238E27FC236}">
+                <a16:creationId xmlns="" xmlns:a16="http://schemas.microsoft.com/office/drawing/2014/main" id="{E7181887-6331-49AD-AFDC-C8E53F3D57BC}"/>
+              </a:ext>
+            </a:extLst>
+          </p:cNvPr>
+          <p:cNvSpPr/>
+          <p:nvPr/>
+        </p:nvSpPr>
+        <p:spPr>
+          <a:xfrm>
+            <a:off x="1528689" y="980270"/>
+            <a:ext cx="6705600" cy="607842"/>
+          </a:xfrm>
+          <a:prstGeom prst="roundRect">
+            <a:avLst/>
+          </a:prstGeom>
+        </p:spPr>
+        <p:style>
+          <a:lnRef idx="2">
+            <a:schemeClr val="accent1"/>
+          </a:lnRef>
+          <a:fillRef idx="1">
+            <a:schemeClr val="lt1"/>
+          </a:fillRef>
+          <a:effectRef idx="0">
+            <a:schemeClr val="accent1"/>
+          </a:effectRef>
+          <a:fontRef idx="minor">
+            <a:schemeClr val="dk1"/>
+          </a:fontRef>
+        </p:style>
+        <p:txBody>
+          <a:bodyPr rtlCol="0" anchor="ctr"/>
+          <a:lstStyle/>
+          <a:p>
+            <a:r>
+              <a:rPr lang="en-US" b="1" dirty="0"/>
+              <a:t>1. </a:t>
+            </a:r>
+            <a:r>
+              <a:rPr lang="en-US" b="1" dirty="0" err="1"/>
+              <a:t>Đăng</a:t>
+            </a:r>
+            <a:r>
+              <a:rPr lang="en-US" b="1" dirty="0"/>
+              <a:t> </a:t>
+            </a:r>
+            <a:r>
+              <a:rPr lang="en-US" b="1" dirty="0" err="1"/>
+              <a:t>ký</a:t>
+            </a:r>
+            <a:r>
+              <a:rPr lang="en-US" b="1" dirty="0"/>
+              <a:t> </a:t>
+            </a:r>
+            <a:r>
+              <a:rPr lang="en-US" b="1" dirty="0" err="1"/>
+              <a:t>tài</a:t>
+            </a:r>
+            <a:r>
+              <a:rPr lang="en-US" b="1" dirty="0"/>
+              <a:t> </a:t>
+            </a:r>
+            <a:r>
+              <a:rPr lang="en-US" b="1" dirty="0" err="1"/>
+              <a:t>khoản</a:t>
+            </a:r>
+            <a:r>
+              <a:rPr lang="en-US" b="1" dirty="0"/>
+              <a:t> GitHub </a:t>
+            </a:r>
+            <a:r>
+              <a:rPr lang="en-US" dirty="0" err="1"/>
+              <a:t>tại</a:t>
+            </a:r>
+            <a:r>
+              <a:rPr lang="en-US" dirty="0"/>
+              <a:t> </a:t>
+            </a:r>
+            <a:r>
+              <a:rPr lang="en-US" dirty="0">
+                <a:hlinkClick r:id="rId2"/>
+              </a:rPr>
+              <a:t>http://github.com</a:t>
+            </a:r>
+            <a:endParaRPr lang="en-US" dirty="0"/>
+          </a:p>
+        </p:txBody>
+      </p:sp>
+      <p:sp>
+        <p:nvSpPr>
+          <p:cNvPr id="4" name="Rectangle: Rounded Corners 3">
+            <a:extLst>
+              <a:ext uri="{FF2B5EF4-FFF2-40B4-BE49-F238E27FC236}">
+                <a16:creationId xmlns="" xmlns:a16="http://schemas.microsoft.com/office/drawing/2014/main" id="{718F25A0-5D3F-4194-9A31-4C6C3F4D8C7B}"/>
+              </a:ext>
+            </a:extLst>
+          </p:cNvPr>
+          <p:cNvSpPr/>
+          <p:nvPr/>
+        </p:nvSpPr>
+        <p:spPr>
+          <a:xfrm>
+            <a:off x="1513449" y="1797624"/>
+            <a:ext cx="6700911" cy="1196340"/>
+          </a:xfrm>
+          <a:prstGeom prst="roundRect">
+            <a:avLst/>
+          </a:prstGeom>
+        </p:spPr>
+        <p:style>
+          <a:lnRef idx="2">
+            <a:schemeClr val="accent1"/>
+          </a:lnRef>
+          <a:fillRef idx="1">
+            <a:schemeClr val="lt1"/>
+          </a:fillRef>
+          <a:effectRef idx="0">
+            <a:schemeClr val="accent1"/>
+          </a:effectRef>
+          <a:fontRef idx="minor">
+            <a:schemeClr val="dk1"/>
+          </a:fontRef>
+        </p:style>
+        <p:txBody>
+          <a:bodyPr rtlCol="0" anchor="ctr"/>
+          <a:lstStyle/>
+          <a:p>
+            <a:r>
+              <a:rPr lang="en-US" b="1" dirty="0"/>
+              <a:t>2. Download </a:t>
+            </a:r>
+            <a:r>
+              <a:rPr lang="en-US" b="1" dirty="0" err="1"/>
+              <a:t>và</a:t>
+            </a:r>
+            <a:r>
+              <a:rPr lang="en-US" b="1" dirty="0"/>
+              <a:t> </a:t>
+            </a:r>
+            <a:r>
+              <a:rPr lang="en-US" b="1" dirty="0" err="1"/>
+              <a:t>cài</a:t>
+            </a:r>
+            <a:r>
+              <a:rPr lang="en-US" b="1" dirty="0"/>
+              <a:t> </a:t>
+            </a:r>
+            <a:r>
+              <a:rPr lang="en-US" b="1" dirty="0" err="1"/>
+              <a:t>đặt</a:t>
+            </a:r>
+            <a:r>
+              <a:rPr lang="en-US" b="1" dirty="0"/>
+              <a:t> </a:t>
+            </a:r>
+            <a:r>
+              <a:rPr lang="en-US" b="1" dirty="0" err="1"/>
+              <a:t>công</a:t>
+            </a:r>
+            <a:r>
+              <a:rPr lang="en-US" b="1" dirty="0"/>
+              <a:t> </a:t>
+            </a:r>
+            <a:r>
+              <a:rPr lang="en-US" b="1" dirty="0" err="1"/>
+              <a:t>cụ</a:t>
+            </a:r>
+            <a:r>
+              <a:rPr lang="en-US" b="1" dirty="0"/>
+              <a:t> Git :</a:t>
+            </a:r>
+          </a:p>
+          <a:p>
+            <a:r>
+              <a:rPr lang="en-US" dirty="0"/>
+              <a:t> </a:t>
+            </a:r>
+          </a:p>
+          <a:p>
+            <a:r>
+              <a:rPr lang="en-US" dirty="0"/>
+              <a:t>	Download </a:t>
+            </a:r>
+            <a:r>
+              <a:rPr lang="en-US" dirty="0" err="1"/>
+              <a:t>tại</a:t>
+            </a:r>
+            <a:r>
+              <a:rPr lang="en-US" dirty="0"/>
+              <a:t> : </a:t>
+            </a:r>
+            <a:r>
+              <a:rPr lang="en-US" dirty="0">
+                <a:hlinkClick r:id="rId3"/>
+              </a:rPr>
+              <a:t>http://git-scm.com/download</a:t>
+            </a:r>
+            <a:endParaRPr lang="en-US" dirty="0"/>
+          </a:p>
+          <a:p>
+            <a:endParaRPr lang="en-US" dirty="0"/>
+          </a:p>
+        </p:txBody>
+      </p:sp>
+      <p:sp>
+        <p:nvSpPr>
+          <p:cNvPr id="5" name="Rectangle: Rounded Corners 4">
+            <a:extLst>
+              <a:ext uri="{FF2B5EF4-FFF2-40B4-BE49-F238E27FC236}">
+                <a16:creationId xmlns="" xmlns:a16="http://schemas.microsoft.com/office/drawing/2014/main" id="{8524485D-D529-4461-90B0-6C5D2FFEB2F0}"/>
+              </a:ext>
+            </a:extLst>
+          </p:cNvPr>
+          <p:cNvSpPr/>
+          <p:nvPr/>
+        </p:nvSpPr>
+        <p:spPr>
+          <a:xfrm>
+            <a:off x="1524000" y="3203476"/>
+            <a:ext cx="6705600" cy="1025698"/>
+          </a:xfrm>
+          <a:prstGeom prst="roundRect">
+            <a:avLst/>
+          </a:prstGeom>
+        </p:spPr>
+        <p:style>
+          <a:lnRef idx="2">
+            <a:schemeClr val="accent1"/>
+          </a:lnRef>
+          <a:fillRef idx="1">
+            <a:schemeClr val="lt1"/>
+          </a:fillRef>
+          <a:effectRef idx="0">
+            <a:schemeClr val="accent1"/>
+          </a:effectRef>
+          <a:fontRef idx="minor">
+            <a:schemeClr val="dk1"/>
+          </a:fontRef>
+        </p:style>
+        <p:txBody>
+          <a:bodyPr rtlCol="0" anchor="ctr"/>
+          <a:lstStyle/>
+          <a:p>
+            <a:r>
+              <a:rPr lang="en-US" b="1" dirty="0"/>
+              <a:t>3</a:t>
+            </a:r>
+            <a:r>
+              <a:rPr lang="en-US" dirty="0"/>
+              <a:t>.</a:t>
+            </a:r>
+            <a:r>
+              <a:rPr lang="en-US" b="1" dirty="0"/>
+              <a:t>Tạo SSH Key </a:t>
+            </a:r>
+            <a:r>
+              <a:rPr lang="en-US" dirty="0"/>
+              <a:t>: SSH Key </a:t>
+            </a:r>
+            <a:r>
+              <a:rPr lang="en-US" dirty="0" err="1"/>
+              <a:t>là</a:t>
+            </a:r>
+            <a:r>
+              <a:rPr lang="en-US" dirty="0"/>
+              <a:t> </a:t>
+            </a:r>
+            <a:r>
+              <a:rPr lang="en-US" dirty="0" err="1"/>
+              <a:t>một</a:t>
+            </a:r>
+            <a:r>
+              <a:rPr lang="en-US" dirty="0"/>
+              <a:t> </a:t>
+            </a:r>
+            <a:r>
+              <a:rPr lang="en-US" dirty="0" err="1"/>
+              <a:t>mã</a:t>
+            </a:r>
+            <a:r>
+              <a:rPr lang="en-US" dirty="0"/>
+              <a:t> </a:t>
+            </a:r>
+            <a:r>
+              <a:rPr lang="en-US" dirty="0" err="1"/>
+              <a:t>chứng</a:t>
+            </a:r>
+            <a:r>
+              <a:rPr lang="en-US" dirty="0"/>
+              <a:t> </a:t>
+            </a:r>
+            <a:r>
+              <a:rPr lang="en-US" dirty="0" err="1"/>
+              <a:t>nhận</a:t>
+            </a:r>
+            <a:r>
+              <a:rPr lang="en-US" dirty="0"/>
+              <a:t> </a:t>
+            </a:r>
+            <a:r>
+              <a:rPr lang="en-US" dirty="0" err="1"/>
+              <a:t>để</a:t>
+            </a:r>
+            <a:r>
+              <a:rPr lang="en-US" dirty="0"/>
+              <a:t> </a:t>
+            </a:r>
+            <a:r>
+              <a:rPr lang="en-US" dirty="0" err="1"/>
+              <a:t>bạn</a:t>
+            </a:r>
+            <a:r>
+              <a:rPr lang="en-US" dirty="0"/>
+              <a:t> </a:t>
+            </a:r>
+            <a:r>
+              <a:rPr lang="en-US" dirty="0" err="1"/>
+              <a:t>có</a:t>
+            </a:r>
+            <a:r>
+              <a:rPr lang="en-US" dirty="0"/>
+              <a:t> </a:t>
+            </a:r>
+            <a:r>
+              <a:rPr lang="en-US" dirty="0" err="1"/>
+              <a:t>quyền</a:t>
+            </a:r>
+            <a:r>
+              <a:rPr lang="en-US" dirty="0"/>
+              <a:t> </a:t>
+            </a:r>
+            <a:r>
+              <a:rPr lang="en-US" dirty="0" err="1"/>
+              <a:t>thao</a:t>
+            </a:r>
+            <a:r>
+              <a:rPr lang="en-US" dirty="0"/>
+              <a:t> </a:t>
+            </a:r>
+            <a:r>
+              <a:rPr lang="en-US" dirty="0" err="1"/>
+              <a:t>tác</a:t>
+            </a:r>
+            <a:r>
+              <a:rPr lang="en-US" dirty="0"/>
+              <a:t> </a:t>
+            </a:r>
+            <a:r>
+              <a:rPr lang="en-US" dirty="0" err="1"/>
+              <a:t>trên</a:t>
+            </a:r>
+            <a:r>
+              <a:rPr lang="en-US" dirty="0"/>
+              <a:t> repository </a:t>
+            </a:r>
+            <a:r>
+              <a:rPr lang="en-US" dirty="0" err="1"/>
+              <a:t>của</a:t>
+            </a:r>
+            <a:r>
+              <a:rPr lang="en-US" dirty="0"/>
+              <a:t> GitHub, SSH Key </a:t>
+            </a:r>
+            <a:r>
+              <a:rPr lang="en-US" dirty="0" err="1"/>
+              <a:t>sẽ</a:t>
+            </a:r>
+            <a:r>
+              <a:rPr lang="en-US" dirty="0"/>
+              <a:t> </a:t>
+            </a:r>
+            <a:r>
+              <a:rPr lang="en-US" dirty="0" err="1"/>
+              <a:t>mang</a:t>
+            </a:r>
+            <a:r>
+              <a:rPr lang="en-US" dirty="0"/>
+              <a:t> </a:t>
+            </a:r>
+            <a:r>
+              <a:rPr lang="en-US" dirty="0" err="1"/>
+              <a:t>tất</a:t>
+            </a:r>
+            <a:r>
+              <a:rPr lang="en-US" dirty="0"/>
+              <a:t> </a:t>
+            </a:r>
+            <a:r>
+              <a:rPr lang="en-US" dirty="0" err="1"/>
+              <a:t>cả</a:t>
+            </a:r>
+            <a:r>
+              <a:rPr lang="en-US" dirty="0"/>
+              <a:t> </a:t>
+            </a:r>
+            <a:r>
+              <a:rPr lang="en-US" dirty="0" err="1"/>
+              <a:t>thông</a:t>
+            </a:r>
+            <a:r>
+              <a:rPr lang="en-US" dirty="0"/>
+              <a:t> tin </a:t>
+            </a:r>
+            <a:r>
+              <a:rPr lang="en-US" dirty="0" err="1"/>
+              <a:t>về</a:t>
+            </a:r>
+            <a:r>
+              <a:rPr lang="en-US" dirty="0"/>
+              <a:t> account </a:t>
+            </a:r>
+            <a:r>
+              <a:rPr lang="en-US" dirty="0" err="1"/>
+              <a:t>của</a:t>
+            </a:r>
+            <a:r>
+              <a:rPr lang="en-US" dirty="0"/>
+              <a:t> </a:t>
+            </a:r>
+            <a:r>
+              <a:rPr lang="en-US" dirty="0" err="1"/>
+              <a:t>bạn</a:t>
+            </a:r>
+            <a:r>
+              <a:rPr lang="en-US" dirty="0"/>
+              <a:t>.</a:t>
+            </a:r>
+          </a:p>
+        </p:txBody>
+      </p:sp>
+      <p:sp>
+        <p:nvSpPr>
+          <p:cNvPr id="7" name="Rectangle: Rounded Corners 6">
+            <a:extLst>
+              <a:ext uri="{FF2B5EF4-FFF2-40B4-BE49-F238E27FC236}">
+                <a16:creationId xmlns="" xmlns:a16="http://schemas.microsoft.com/office/drawing/2014/main" id="{BA277D66-98E7-47B2-A2E9-35046D1CE172}"/>
+              </a:ext>
+            </a:extLst>
+          </p:cNvPr>
+          <p:cNvSpPr/>
+          <p:nvPr/>
+        </p:nvSpPr>
+        <p:spPr>
+          <a:xfrm>
+            <a:off x="1524000" y="4648199"/>
+            <a:ext cx="6705600" cy="868609"/>
+          </a:xfrm>
+          <a:prstGeom prst="roundRect">
+            <a:avLst/>
+          </a:prstGeom>
+        </p:spPr>
+        <p:style>
+          <a:lnRef idx="2">
+            <a:schemeClr val="accent1"/>
+          </a:lnRef>
+          <a:fillRef idx="1">
+            <a:schemeClr val="lt1"/>
+          </a:fillRef>
+          <a:effectRef idx="0">
+            <a:schemeClr val="accent1"/>
+          </a:effectRef>
+          <a:fontRef idx="minor">
+            <a:schemeClr val="dk1"/>
+          </a:fontRef>
+        </p:style>
+        <p:txBody>
+          <a:bodyPr rtlCol="0" anchor="ctr"/>
+          <a:lstStyle/>
+          <a:p>
+            <a:r>
+              <a:rPr lang="en-US" b="1" dirty="0"/>
+              <a:t>4. </a:t>
+            </a:r>
+            <a:r>
+              <a:rPr lang="en-US" b="1" dirty="0" err="1"/>
+              <a:t>Tạo</a:t>
+            </a:r>
+            <a:r>
+              <a:rPr lang="en-US" b="1" dirty="0"/>
+              <a:t> repository </a:t>
+            </a:r>
+            <a:r>
+              <a:rPr lang="en-US" b="1" dirty="0" err="1"/>
+              <a:t>cho</a:t>
+            </a:r>
+            <a:r>
+              <a:rPr lang="en-US" b="1" dirty="0"/>
+              <a:t> project </a:t>
+            </a:r>
+            <a:r>
+              <a:rPr lang="en-US" b="1" dirty="0" err="1"/>
+              <a:t>mới</a:t>
+            </a:r>
+            <a:r>
+              <a:rPr lang="en-US" b="1" dirty="0"/>
+              <a:t> </a:t>
+            </a:r>
+            <a:r>
+              <a:rPr lang="en-US" b="1" dirty="0" err="1"/>
+              <a:t>trên</a:t>
+            </a:r>
+            <a:r>
+              <a:rPr lang="en-US" b="1" dirty="0"/>
+              <a:t> GitHub </a:t>
+            </a:r>
+            <a:r>
+              <a:rPr lang="en-US" dirty="0"/>
+              <a:t>	: </a:t>
+            </a:r>
+            <a:r>
+              <a:rPr lang="en-US" dirty="0">
+                <a:hlinkClick r:id="rId4"/>
+              </a:rPr>
+              <a:t>https://github.com</a:t>
+            </a:r>
+            <a:r>
+              <a:rPr lang="en-US" dirty="0"/>
+              <a:t> (</a:t>
+            </a:r>
+            <a:r>
+              <a:rPr lang="en-US" dirty="0" err="1"/>
+              <a:t>sau</a:t>
+            </a:r>
+            <a:r>
+              <a:rPr lang="en-US" dirty="0"/>
+              <a:t> </a:t>
+            </a:r>
+            <a:r>
+              <a:rPr lang="en-US" dirty="0" err="1"/>
+              <a:t>khi</a:t>
+            </a:r>
+            <a:r>
+              <a:rPr lang="en-US" dirty="0"/>
+              <a:t> </a:t>
+            </a:r>
+            <a:r>
+              <a:rPr lang="en-US" dirty="0" err="1"/>
+              <a:t>đã</a:t>
+            </a:r>
+            <a:r>
+              <a:rPr lang="en-US" dirty="0"/>
+              <a:t> </a:t>
+            </a:r>
+            <a:r>
+              <a:rPr lang="en-US" dirty="0" err="1"/>
+              <a:t>đăng</a:t>
+            </a:r>
+            <a:r>
+              <a:rPr lang="en-US" dirty="0"/>
+              <a:t> </a:t>
+            </a:r>
+            <a:r>
+              <a:rPr lang="en-US" dirty="0" err="1"/>
+              <a:t>nhập</a:t>
+            </a:r>
+            <a:r>
+              <a:rPr lang="en-US" dirty="0"/>
+              <a:t>)</a:t>
+            </a:r>
+            <a:br>
+              <a:rPr lang="en-US" dirty="0"/>
+            </a:br>
+            <a:endParaRPr lang="en-US" dirty="0"/>
+          </a:p>
+        </p:txBody>
+      </p:sp>
+      <p:sp>
+        <p:nvSpPr>
+          <p:cNvPr id="8" name="Rectangle: Rounded Corners 7">
+            <a:extLst>
+              <a:ext uri="{FF2B5EF4-FFF2-40B4-BE49-F238E27FC236}">
+                <a16:creationId xmlns="" xmlns:a16="http://schemas.microsoft.com/office/drawing/2014/main" id="{05B5A727-C75A-4A2B-A360-C70FBD15A7C5}"/>
+              </a:ext>
+            </a:extLst>
+          </p:cNvPr>
+          <p:cNvSpPr/>
+          <p:nvPr/>
+        </p:nvSpPr>
+        <p:spPr>
+          <a:xfrm>
+            <a:off x="1513449" y="5775229"/>
+            <a:ext cx="6705600" cy="701771"/>
+          </a:xfrm>
+          <a:prstGeom prst="roundRect">
+            <a:avLst/>
+          </a:prstGeom>
+        </p:spPr>
+        <p:style>
+          <a:lnRef idx="2">
+            <a:schemeClr val="accent1"/>
+          </a:lnRef>
+          <a:fillRef idx="1">
+            <a:schemeClr val="lt1"/>
+          </a:fillRef>
+          <a:effectRef idx="0">
+            <a:schemeClr val="accent1"/>
+          </a:effectRef>
+          <a:fontRef idx="minor">
+            <a:schemeClr val="dk1"/>
+          </a:fontRef>
+        </p:style>
+        <p:txBody>
+          <a:bodyPr rtlCol="0" anchor="ctr"/>
+          <a:lstStyle/>
+          <a:p>
+            <a:r>
+              <a:rPr lang="en-US" b="1" dirty="0"/>
+              <a:t>5. </a:t>
+            </a:r>
+            <a:r>
+              <a:rPr lang="en-US" b="1" dirty="0" err="1"/>
+              <a:t>Khởi</a:t>
+            </a:r>
+            <a:r>
+              <a:rPr lang="en-US" b="1" dirty="0"/>
+              <a:t> </a:t>
+            </a:r>
+            <a:r>
+              <a:rPr lang="en-US" b="1" dirty="0" err="1"/>
+              <a:t>động</a:t>
+            </a:r>
+            <a:r>
+              <a:rPr lang="en-US" b="1" dirty="0"/>
+              <a:t> </a:t>
+            </a:r>
+            <a:r>
+              <a:rPr lang="en-US" b="1" dirty="0" err="1"/>
+              <a:t>với</a:t>
+            </a:r>
+            <a:r>
+              <a:rPr lang="en-US" b="1" dirty="0"/>
+              <a:t> Git command line </a:t>
+            </a:r>
+            <a:r>
+              <a:rPr lang="en-US" dirty="0" err="1"/>
+              <a:t>trên</a:t>
+            </a:r>
+            <a:r>
+              <a:rPr lang="en-US" dirty="0"/>
+              <a:t> local</a:t>
+            </a:r>
+            <a:br>
+              <a:rPr lang="en-US" dirty="0"/>
+            </a:br>
+            <a:endParaRPr lang="en-US" dirty="0"/>
+          </a:p>
+        </p:txBody>
+      </p:sp>
+    </p:spTree>
+    <p:extLst>
+      <p:ext uri="{BB962C8B-B14F-4D97-AF65-F5344CB8AC3E}">
+        <p14:creationId xmlns:p14="http://schemas.microsoft.com/office/powerpoint/2010/main" val="3391270706"/>
+      </p:ext>
+    </p:extLst>
+  </p:cSld>
+  <p:clrMapOvr>
+    <a:masterClrMapping/>
+  </p:clrMapOvr>
+  <p:timing>
+    <p:tnLst>
+      <p:par>
+        <p:cTn id="1" dur="indefinite" restart="never" nodeType="tmRoot"/>
+      </p:par>
+    </p:tnLst>
+  </p:timing>
+</p:sld>
+</file>
+
+<file path=ppt/slides/slide11.xml><?xml version="1.0" encoding="utf-8"?>
+<p:sld xmlns:a="http://schemas.openxmlformats.org/drawingml/2006/main" xmlns:r="http://schemas.openxmlformats.org/officeDocument/2006/relationships" xmlns:p="http://schemas.openxmlformats.org/presentationml/2006/main">
+  <p:cSld>
+    <p:spTree>
+      <p:nvGrpSpPr>
+        <p:cNvPr id="1" name=""/>
+        <p:cNvGrpSpPr/>
+        <p:nvPr/>
+      </p:nvGrpSpPr>
+      <p:grpSpPr>
+        <a:xfrm>
+          <a:off x="0" y="0"/>
+          <a:ext cx="0" cy="0"/>
+          <a:chOff x="0" y="0"/>
+          <a:chExt cx="0" cy="0"/>
+        </a:xfrm>
+      </p:grpSpPr>
+      <p:sp>
+        <p:nvSpPr>
           <p:cNvPr id="4" name="Rectangle 3">
             <a:extLst>
               <a:ext uri="{FF2B5EF4-FFF2-40B4-BE49-F238E27FC236}">
-                <a16:creationId xmlns:a16="http://schemas.microsoft.com/office/drawing/2014/main" xmlns="" id="{AF904853-94CC-41F5-8D94-BFD0CF1F807C}"/>
+                <a16:creationId xmlns="" xmlns:a16="http://schemas.microsoft.com/office/drawing/2014/main" id="{AF904853-94CC-41F5-8D94-BFD0CF1F807C}"/>
               </a:ext>
             </a:extLst>
           </p:cNvPr>
@@ -5261,7 +6038,7 @@
           <p:cNvPr id="5" name="Rectangle 4">
             <a:extLst>
               <a:ext uri="{FF2B5EF4-FFF2-40B4-BE49-F238E27FC236}">
-                <a16:creationId xmlns:a16="http://schemas.microsoft.com/office/drawing/2014/main" xmlns="" id="{E5EC1EA2-C069-4944-81C8-D62C3A6E7464}"/>
+                <a16:creationId xmlns="" xmlns:a16="http://schemas.microsoft.com/office/drawing/2014/main" id="{E5EC1EA2-C069-4944-81C8-D62C3A6E7464}"/>
               </a:ext>
             </a:extLst>
           </p:cNvPr>
@@ -5436,7 +6213,7 @@
 </p:sld>
 </file>
 
-<file path=ppt/slides/slide11.xml><?xml version="1.0" encoding="utf-8"?>
+<file path=ppt/slides/slide12.xml><?xml version="1.0" encoding="utf-8"?>
 <p:sld xmlns:a="http://schemas.openxmlformats.org/drawingml/2006/main" xmlns:r="http://schemas.openxmlformats.org/officeDocument/2006/relationships" xmlns:p="http://schemas.openxmlformats.org/presentationml/2006/main">
   <p:cSld>
     <p:spTree>
@@ -5554,6 +6331,701 @@
 </file>
 
 <file path=ppt/slides/slide2.xml><?xml version="1.0" encoding="utf-8"?>
+<p:sld xmlns:a="http://schemas.openxmlformats.org/drawingml/2006/main" xmlns:r="http://schemas.openxmlformats.org/officeDocument/2006/relationships" xmlns:p="http://schemas.openxmlformats.org/presentationml/2006/main">
+  <p:cSld>
+    <p:spTree>
+      <p:nvGrpSpPr>
+        <p:cNvPr id="1" name=""/>
+        <p:cNvGrpSpPr/>
+        <p:nvPr/>
+      </p:nvGrpSpPr>
+      <p:grpSpPr>
+        <a:xfrm>
+          <a:off x="0" y="0"/>
+          <a:ext cx="0" cy="0"/>
+          <a:chOff x="0" y="0"/>
+          <a:chExt cx="0" cy="0"/>
+        </a:xfrm>
+      </p:grpSpPr>
+      <p:sp>
+        <p:nvSpPr>
+          <p:cNvPr id="2" name="Title 1"/>
+          <p:cNvSpPr>
+            <a:spLocks noGrp="1"/>
+          </p:cNvSpPr>
+          <p:nvPr>
+            <p:ph type="ctrTitle"/>
+          </p:nvPr>
+        </p:nvSpPr>
+        <p:spPr>
+          <a:xfrm>
+            <a:off x="1828800" y="1524000"/>
+            <a:ext cx="5700933" cy="1219200"/>
+          </a:xfrm>
+        </p:spPr>
+        <p:txBody>
+          <a:bodyPr/>
+          <a:lstStyle/>
+          <a:p>
+            <a:pPr algn="ctr"/>
+            <a:r>
+              <a:rPr lang="en-US" sz="4400" dirty="0"/>
+              <a:t>GIT AND GITHUB</a:t>
+            </a:r>
+          </a:p>
+        </p:txBody>
+      </p:sp>
+      <p:sp>
+        <p:nvSpPr>
+          <p:cNvPr id="3" name="Subtitle 2"/>
+          <p:cNvSpPr>
+            <a:spLocks noGrp="1"/>
+          </p:cNvSpPr>
+          <p:nvPr>
+            <p:ph type="subTitle" idx="1"/>
+          </p:nvPr>
+        </p:nvSpPr>
+        <p:spPr>
+          <a:xfrm>
+            <a:off x="2334065" y="3009900"/>
+            <a:ext cx="4828735" cy="762000"/>
+          </a:xfrm>
+        </p:spPr>
+        <p:txBody>
+          <a:bodyPr>
+            <a:normAutofit/>
+          </a:bodyPr>
+          <a:lstStyle/>
+          <a:p>
+            <a:pPr algn="ctr"/>
+            <a:r>
+              <a:rPr lang="en-US" dirty="0">
+                <a:solidFill>
+                  <a:schemeClr val="tx1"/>
+                </a:solidFill>
+              </a:rPr>
+              <a:t>HỌC PHẦN : QUẢN LÝ DỰ ÁN PHẦN MỀM</a:t>
+            </a:r>
+          </a:p>
+          <a:p>
+            <a:pPr algn="ctr"/>
+            <a:r>
+              <a:rPr lang="en-US" dirty="0" err="1">
+                <a:solidFill>
+                  <a:schemeClr val="tx1"/>
+                </a:solidFill>
+              </a:rPr>
+              <a:t>Giảng</a:t>
+            </a:r>
+            <a:r>
+              <a:rPr lang="en-US" dirty="0">
+                <a:solidFill>
+                  <a:schemeClr val="tx1"/>
+                </a:solidFill>
+              </a:rPr>
+              <a:t> </a:t>
+            </a:r>
+            <a:r>
+              <a:rPr lang="en-US" dirty="0" err="1">
+                <a:solidFill>
+                  <a:schemeClr val="tx1"/>
+                </a:solidFill>
+              </a:rPr>
+              <a:t>viên</a:t>
+            </a:r>
+            <a:r>
+              <a:rPr lang="en-US" dirty="0">
+                <a:solidFill>
+                  <a:schemeClr val="tx1"/>
+                </a:solidFill>
+              </a:rPr>
+              <a:t> : </a:t>
+            </a:r>
+            <a:r>
+              <a:rPr lang="en-US" dirty="0" err="1">
+                <a:solidFill>
+                  <a:schemeClr val="tx1"/>
+                </a:solidFill>
+              </a:rPr>
+              <a:t>Nguyễn</a:t>
+            </a:r>
+            <a:r>
+              <a:rPr lang="en-US" dirty="0">
+                <a:solidFill>
+                  <a:schemeClr val="tx1"/>
+                </a:solidFill>
+              </a:rPr>
+              <a:t> </a:t>
+            </a:r>
+            <a:r>
+              <a:rPr lang="en-US" dirty="0" err="1">
+                <a:solidFill>
+                  <a:schemeClr val="tx1"/>
+                </a:solidFill>
+              </a:rPr>
+              <a:t>Ngọc</a:t>
+            </a:r>
+            <a:r>
+              <a:rPr lang="en-US" dirty="0">
+                <a:solidFill>
+                  <a:schemeClr val="tx1"/>
+                </a:solidFill>
+              </a:rPr>
+              <a:t> </a:t>
+            </a:r>
+            <a:r>
+              <a:rPr lang="en-US" dirty="0" err="1">
+                <a:solidFill>
+                  <a:schemeClr val="tx1"/>
+                </a:solidFill>
+              </a:rPr>
+              <a:t>Thảo</a:t>
+            </a:r>
+            <a:r>
+              <a:rPr lang="en-US" dirty="0">
+                <a:solidFill>
+                  <a:schemeClr val="tx1"/>
+                </a:solidFill>
+              </a:rPr>
+              <a:t> </a:t>
+            </a:r>
+            <a:r>
+              <a:rPr lang="en-US" dirty="0" err="1">
+                <a:solidFill>
+                  <a:schemeClr val="tx1"/>
+                </a:solidFill>
+              </a:rPr>
+              <a:t>Nguyên</a:t>
+            </a:r>
+            <a:endParaRPr lang="en-US" dirty="0">
+              <a:solidFill>
+                <a:schemeClr val="tx1"/>
+              </a:solidFill>
+            </a:endParaRPr>
+          </a:p>
+          <a:p>
+            <a:pPr algn="ctr"/>
+            <a:endParaRPr lang="en-US" dirty="0">
+              <a:solidFill>
+                <a:schemeClr val="tx1"/>
+              </a:solidFill>
+            </a:endParaRPr>
+          </a:p>
+        </p:txBody>
+      </p:sp>
+      <p:sp>
+        <p:nvSpPr>
+          <p:cNvPr id="6" name="Subtitle 2"/>
+          <p:cNvSpPr txBox="1">
+            <a:spLocks/>
+          </p:cNvSpPr>
+          <p:nvPr/>
+        </p:nvSpPr>
+        <p:spPr>
+          <a:xfrm>
+            <a:off x="2895600" y="4800600"/>
+            <a:ext cx="3962400" cy="1524000"/>
+          </a:xfrm>
+          <a:prstGeom prst="rect">
+            <a:avLst/>
+          </a:prstGeom>
+        </p:spPr>
+        <p:txBody>
+          <a:bodyPr vert="horz" lIns="91440" tIns="45720" rIns="91440" bIns="45720" rtlCol="0">
+            <a:normAutofit fontScale="70000" lnSpcReduction="20000"/>
+          </a:bodyPr>
+          <a:lstStyle/>
+          <a:p>
+            <a:pPr marL="0" marR="0" lvl="0" indent="0" defTabSz="914400" rtl="0" eaLnBrk="1" fontAlgn="auto" latinLnBrk="0" hangingPunct="1">
+              <a:lnSpc>
+                <a:spcPct val="100000"/>
+              </a:lnSpc>
+              <a:spcBef>
+                <a:spcPct val="20000"/>
+              </a:spcBef>
+              <a:spcAft>
+                <a:spcPts val="0"/>
+              </a:spcAft>
+              <a:buClrTx/>
+              <a:buSzTx/>
+              <a:buFont typeface="Arial" pitchFamily="34" charset="0"/>
+              <a:buNone/>
+              <a:tabLst/>
+              <a:defRPr/>
+            </a:pPr>
+            <a:r>
+              <a:rPr kumimoji="0" lang="en-US" sz="3200" b="0" i="0" u="none" strike="noStrike" kern="1200" cap="none" spc="0" normalizeH="0" baseline="0" noProof="0" dirty="0">
+                <a:ln>
+                  <a:noFill/>
+                </a:ln>
+                <a:solidFill>
+                  <a:schemeClr val="tx1"/>
+                </a:solidFill>
+                <a:effectLst/>
+                <a:uLnTx/>
+                <a:uFillTx/>
+                <a:latin typeface="+mn-lt"/>
+                <a:ea typeface="+mn-ea"/>
+                <a:cs typeface="+mn-cs"/>
+              </a:rPr>
+              <a:t>SVTH: 	</a:t>
+            </a:r>
+            <a:r>
+              <a:rPr kumimoji="0" lang="en-US" sz="3200" b="0" i="0" u="none" strike="noStrike" kern="1200" cap="none" spc="0" normalizeH="0" baseline="0" noProof="0" dirty="0" err="1">
+                <a:ln>
+                  <a:noFill/>
+                </a:ln>
+                <a:solidFill>
+                  <a:schemeClr val="tx1"/>
+                </a:solidFill>
+                <a:effectLst/>
+                <a:uLnTx/>
+                <a:uFillTx/>
+                <a:latin typeface="+mn-lt"/>
+                <a:ea typeface="+mn-ea"/>
+                <a:cs typeface="+mn-cs"/>
+              </a:rPr>
+              <a:t>Đặng</a:t>
+            </a:r>
+            <a:r>
+              <a:rPr kumimoji="0" lang="en-US" sz="3200" b="0" i="0" u="none" strike="noStrike" kern="1200" cap="none" spc="0" normalizeH="0" noProof="0" dirty="0">
+                <a:ln>
+                  <a:noFill/>
+                </a:ln>
+                <a:solidFill>
+                  <a:schemeClr val="tx1"/>
+                </a:solidFill>
+                <a:effectLst/>
+                <a:uLnTx/>
+                <a:uFillTx/>
+                <a:latin typeface="+mn-lt"/>
+                <a:ea typeface="+mn-ea"/>
+                <a:cs typeface="+mn-cs"/>
+              </a:rPr>
+              <a:t> </a:t>
+            </a:r>
+            <a:r>
+              <a:rPr kumimoji="0" lang="en-US" sz="3200" b="0" i="0" u="none" strike="noStrike" kern="1200" cap="none" spc="0" normalizeH="0" noProof="0" dirty="0" err="1">
+                <a:ln>
+                  <a:noFill/>
+                </a:ln>
+                <a:solidFill>
+                  <a:schemeClr val="tx1"/>
+                </a:solidFill>
+                <a:effectLst/>
+                <a:uLnTx/>
+                <a:uFillTx/>
+                <a:latin typeface="+mn-lt"/>
+                <a:ea typeface="+mn-ea"/>
+                <a:cs typeface="+mn-cs"/>
+              </a:rPr>
+              <a:t>Hồng</a:t>
+            </a:r>
+            <a:r>
+              <a:rPr kumimoji="0" lang="en-US" sz="3200" b="0" i="0" u="none" strike="noStrike" kern="1200" cap="none" spc="0" normalizeH="0" noProof="0" dirty="0">
+                <a:ln>
+                  <a:noFill/>
+                </a:ln>
+                <a:solidFill>
+                  <a:schemeClr val="tx1"/>
+                </a:solidFill>
+                <a:effectLst/>
+                <a:uLnTx/>
+                <a:uFillTx/>
+                <a:latin typeface="+mn-lt"/>
+                <a:ea typeface="+mn-ea"/>
+                <a:cs typeface="+mn-cs"/>
+              </a:rPr>
+              <a:t> </a:t>
+            </a:r>
+            <a:r>
+              <a:rPr kumimoji="0" lang="en-US" sz="3200" b="0" i="0" u="none" strike="noStrike" kern="1200" cap="none" spc="0" normalizeH="0" noProof="0" dirty="0" err="1">
+                <a:ln>
+                  <a:noFill/>
+                </a:ln>
+                <a:solidFill>
+                  <a:schemeClr val="tx1"/>
+                </a:solidFill>
+                <a:effectLst/>
+                <a:uLnTx/>
+                <a:uFillTx/>
+                <a:latin typeface="+mn-lt"/>
+                <a:ea typeface="+mn-ea"/>
+                <a:cs typeface="+mn-cs"/>
+              </a:rPr>
+              <a:t>Út</a:t>
+            </a:r>
+            <a:r>
+              <a:rPr kumimoji="0" lang="en-US" sz="3200" b="0" i="0" u="none" strike="noStrike" kern="1200" cap="none" spc="0" normalizeH="0" noProof="0" dirty="0">
+                <a:ln>
+                  <a:noFill/>
+                </a:ln>
+                <a:solidFill>
+                  <a:schemeClr val="tx1"/>
+                </a:solidFill>
+                <a:effectLst/>
+                <a:uLnTx/>
+                <a:uFillTx/>
+                <a:latin typeface="+mn-lt"/>
+                <a:ea typeface="+mn-ea"/>
+                <a:cs typeface="+mn-cs"/>
+              </a:rPr>
+              <a:t> </a:t>
+            </a:r>
+            <a:r>
+              <a:rPr kumimoji="0" lang="en-US" sz="3200" b="0" i="0" u="none" strike="noStrike" kern="1200" cap="none" spc="0" normalizeH="0" noProof="0" dirty="0" err="1">
+                <a:ln>
+                  <a:noFill/>
+                </a:ln>
+                <a:solidFill>
+                  <a:schemeClr val="tx1"/>
+                </a:solidFill>
+                <a:effectLst/>
+                <a:uLnTx/>
+                <a:uFillTx/>
+                <a:latin typeface="+mn-lt"/>
+                <a:ea typeface="+mn-ea"/>
+                <a:cs typeface="+mn-cs"/>
+              </a:rPr>
+              <a:t>Nhi</a:t>
+            </a:r>
+            <a:endParaRPr lang="en-US" sz="3200" dirty="0"/>
+          </a:p>
+          <a:p>
+            <a:pPr marL="0" marR="0" lvl="0" indent="0" defTabSz="914400" rtl="0" eaLnBrk="1" fontAlgn="auto" latinLnBrk="0" hangingPunct="1">
+              <a:lnSpc>
+                <a:spcPct val="100000"/>
+              </a:lnSpc>
+              <a:spcBef>
+                <a:spcPct val="20000"/>
+              </a:spcBef>
+              <a:spcAft>
+                <a:spcPts val="0"/>
+              </a:spcAft>
+              <a:buClrTx/>
+              <a:buSzTx/>
+              <a:buFont typeface="Arial" pitchFamily="34" charset="0"/>
+              <a:buNone/>
+              <a:tabLst/>
+              <a:defRPr/>
+            </a:pPr>
+            <a:r>
+              <a:rPr kumimoji="0" lang="en-US" sz="3200" b="0" i="0" u="none" strike="noStrike" kern="1200" cap="none" spc="0" normalizeH="0" baseline="0" noProof="0" dirty="0">
+                <a:ln>
+                  <a:noFill/>
+                </a:ln>
+                <a:solidFill>
+                  <a:schemeClr val="tx1"/>
+                </a:solidFill>
+                <a:effectLst/>
+                <a:uLnTx/>
+                <a:uFillTx/>
+                <a:latin typeface="+mn-lt"/>
+                <a:ea typeface="+mn-ea"/>
+                <a:cs typeface="+mn-cs"/>
+              </a:rPr>
+              <a:t>	</a:t>
+            </a:r>
+            <a:r>
+              <a:rPr kumimoji="0" lang="en-US" sz="3200" b="0" i="0" u="none" strike="noStrike" kern="1200" cap="none" spc="0" normalizeH="0" baseline="0" noProof="0" dirty="0" err="1">
+                <a:ln>
+                  <a:noFill/>
+                </a:ln>
+                <a:solidFill>
+                  <a:schemeClr val="tx1"/>
+                </a:solidFill>
+                <a:effectLst/>
+                <a:uLnTx/>
+                <a:uFillTx/>
+                <a:latin typeface="+mn-lt"/>
+                <a:ea typeface="+mn-ea"/>
+                <a:cs typeface="+mn-cs"/>
+              </a:rPr>
+              <a:t>Võ</a:t>
+            </a:r>
+            <a:r>
+              <a:rPr kumimoji="0" lang="en-US" sz="3200" b="0" i="0" u="none" strike="noStrike" kern="1200" cap="none" spc="0" normalizeH="0" noProof="0" dirty="0">
+                <a:ln>
+                  <a:noFill/>
+                </a:ln>
+                <a:solidFill>
+                  <a:schemeClr val="tx1"/>
+                </a:solidFill>
+                <a:effectLst/>
+                <a:uLnTx/>
+                <a:uFillTx/>
+                <a:latin typeface="+mn-lt"/>
+                <a:ea typeface="+mn-ea"/>
+                <a:cs typeface="+mn-cs"/>
+              </a:rPr>
+              <a:t> </a:t>
+            </a:r>
+            <a:r>
+              <a:rPr kumimoji="0" lang="en-US" sz="3200" b="0" i="0" u="none" strike="noStrike" kern="1200" cap="none" spc="0" normalizeH="0" noProof="0" dirty="0" err="1">
+                <a:ln>
+                  <a:noFill/>
+                </a:ln>
+                <a:solidFill>
+                  <a:schemeClr val="tx1"/>
+                </a:solidFill>
+                <a:effectLst/>
+                <a:uLnTx/>
+                <a:uFillTx/>
+                <a:latin typeface="+mn-lt"/>
+                <a:ea typeface="+mn-ea"/>
+                <a:cs typeface="+mn-cs"/>
+              </a:rPr>
+              <a:t>Thị</a:t>
+            </a:r>
+            <a:r>
+              <a:rPr kumimoji="0" lang="en-US" sz="3200" b="0" i="0" u="none" strike="noStrike" kern="1200" cap="none" spc="0" normalizeH="0" noProof="0" dirty="0">
+                <a:ln>
+                  <a:noFill/>
+                </a:ln>
+                <a:solidFill>
+                  <a:schemeClr val="tx1"/>
+                </a:solidFill>
+                <a:effectLst/>
+                <a:uLnTx/>
+                <a:uFillTx/>
+                <a:latin typeface="+mn-lt"/>
+                <a:ea typeface="+mn-ea"/>
+                <a:cs typeface="+mn-cs"/>
+              </a:rPr>
+              <a:t> </a:t>
+            </a:r>
+            <a:r>
+              <a:rPr kumimoji="0" lang="en-US" sz="3200" b="0" i="0" u="none" strike="noStrike" kern="1200" cap="none" spc="0" normalizeH="0" noProof="0" dirty="0" err="1">
+                <a:ln>
+                  <a:noFill/>
+                </a:ln>
+                <a:solidFill>
+                  <a:schemeClr val="tx1"/>
+                </a:solidFill>
+                <a:effectLst/>
+                <a:uLnTx/>
+                <a:uFillTx/>
+                <a:latin typeface="+mn-lt"/>
+                <a:ea typeface="+mn-ea"/>
+                <a:cs typeface="+mn-cs"/>
+              </a:rPr>
+              <a:t>Hoàng</a:t>
+            </a:r>
+            <a:r>
+              <a:rPr kumimoji="0" lang="en-US" sz="3200" b="0" i="0" u="none" strike="noStrike" kern="1200" cap="none" spc="0" normalizeH="0" noProof="0" dirty="0">
+                <a:ln>
+                  <a:noFill/>
+                </a:ln>
+                <a:solidFill>
+                  <a:schemeClr val="tx1"/>
+                </a:solidFill>
+                <a:effectLst/>
+                <a:uLnTx/>
+                <a:uFillTx/>
+                <a:latin typeface="+mn-lt"/>
+                <a:ea typeface="+mn-ea"/>
+                <a:cs typeface="+mn-cs"/>
+              </a:rPr>
+              <a:t> </a:t>
+            </a:r>
+            <a:r>
+              <a:rPr kumimoji="0" lang="en-US" sz="3200" b="0" i="0" u="none" strike="noStrike" kern="1200" cap="none" spc="0" normalizeH="0" noProof="0" dirty="0" err="1">
+                <a:ln>
+                  <a:noFill/>
+                </a:ln>
+                <a:solidFill>
+                  <a:schemeClr val="tx1"/>
+                </a:solidFill>
+                <a:effectLst/>
+                <a:uLnTx/>
+                <a:uFillTx/>
+                <a:latin typeface="+mn-lt"/>
+                <a:ea typeface="+mn-ea"/>
+                <a:cs typeface="+mn-cs"/>
+              </a:rPr>
+              <a:t>Yến</a:t>
+            </a:r>
+            <a:endParaRPr kumimoji="0" lang="en-US" sz="3200" b="0" i="0" u="none" strike="noStrike" kern="1200" cap="none" spc="0" normalizeH="0" baseline="0" noProof="0" dirty="0">
+              <a:ln>
+                <a:noFill/>
+              </a:ln>
+              <a:solidFill>
+                <a:schemeClr val="tx1"/>
+              </a:solidFill>
+              <a:effectLst/>
+              <a:uLnTx/>
+              <a:uFillTx/>
+              <a:latin typeface="+mn-lt"/>
+              <a:ea typeface="+mn-ea"/>
+              <a:cs typeface="+mn-cs"/>
+            </a:endParaRPr>
+          </a:p>
+          <a:p>
+            <a:pPr lvl="0" defTabSz="914400">
+              <a:spcBef>
+                <a:spcPct val="20000"/>
+              </a:spcBef>
+              <a:defRPr/>
+            </a:pPr>
+            <a:r>
+              <a:rPr kumimoji="0" lang="en-US" sz="3200" b="0" i="0" u="none" strike="noStrike" kern="1200" cap="none" spc="0" normalizeH="0" baseline="0" noProof="0" dirty="0">
+                <a:ln>
+                  <a:noFill/>
+                </a:ln>
+                <a:solidFill>
+                  <a:schemeClr val="tx1"/>
+                </a:solidFill>
+                <a:effectLst/>
+                <a:uLnTx/>
+                <a:uFillTx/>
+                <a:latin typeface="+mn-lt"/>
+                <a:ea typeface="+mn-ea"/>
+                <a:cs typeface="+mn-cs"/>
+              </a:rPr>
+              <a:t>	</a:t>
+            </a:r>
+            <a:r>
+              <a:rPr kumimoji="0" lang="en-US" sz="3200" b="0" i="0" u="none" strike="noStrike" kern="1200" cap="none" spc="0" normalizeH="0" baseline="0" noProof="0" dirty="0" err="1">
+                <a:ln>
+                  <a:noFill/>
+                </a:ln>
+                <a:solidFill>
+                  <a:schemeClr val="tx1"/>
+                </a:solidFill>
+                <a:effectLst/>
+                <a:uLnTx/>
+                <a:uFillTx/>
+                <a:latin typeface="+mn-lt"/>
+                <a:ea typeface="+mn-ea"/>
+                <a:cs typeface="+mn-cs"/>
+              </a:rPr>
+              <a:t>Nguyễn</a:t>
+            </a:r>
+            <a:r>
+              <a:rPr kumimoji="0" lang="en-US" sz="3200" b="0" i="0" u="none" strike="noStrike" kern="1200" cap="none" spc="0" normalizeH="0" noProof="0" dirty="0">
+                <a:ln>
+                  <a:noFill/>
+                </a:ln>
+                <a:solidFill>
+                  <a:schemeClr val="tx1"/>
+                </a:solidFill>
+                <a:effectLst/>
+                <a:uLnTx/>
+                <a:uFillTx/>
+                <a:latin typeface="+mn-lt"/>
+                <a:ea typeface="+mn-ea"/>
+                <a:cs typeface="+mn-cs"/>
+              </a:rPr>
+              <a:t> </a:t>
+            </a:r>
+            <a:r>
+              <a:rPr kumimoji="0" lang="en-US" sz="3200" b="0" i="0" u="none" strike="noStrike" kern="1200" cap="none" spc="0" normalizeH="0" noProof="0" err="1">
+                <a:ln>
+                  <a:noFill/>
+                </a:ln>
+                <a:solidFill>
+                  <a:schemeClr val="tx1"/>
+                </a:solidFill>
+                <a:effectLst/>
+                <a:uLnTx/>
+                <a:uFillTx/>
+                <a:latin typeface="+mn-lt"/>
+                <a:ea typeface="+mn-ea"/>
+                <a:cs typeface="+mn-cs"/>
+              </a:rPr>
+              <a:t>Bão</a:t>
+            </a:r>
+            <a:r>
+              <a:rPr kumimoji="0" lang="en-US" sz="3200" b="0" i="0" u="none" strike="noStrike" kern="1200" cap="none" spc="0" normalizeH="0" noProof="0">
+                <a:ln>
+                  <a:noFill/>
+                </a:ln>
+                <a:solidFill>
+                  <a:schemeClr val="tx1"/>
+                </a:solidFill>
+                <a:effectLst/>
+                <a:uLnTx/>
+                <a:uFillTx/>
+                <a:latin typeface="+mn-lt"/>
+                <a:ea typeface="+mn-ea"/>
+                <a:cs typeface="+mn-cs"/>
+              </a:rPr>
+              <a:t> </a:t>
+            </a:r>
+            <a:r>
+              <a:rPr lang="en-US" sz="3200" smtClean="0"/>
+              <a:t>Huy</a:t>
+            </a:r>
+          </a:p>
+          <a:p>
+            <a:pPr lvl="0" defTabSz="914400">
+              <a:spcBef>
+                <a:spcPct val="20000"/>
+              </a:spcBef>
+              <a:defRPr/>
+            </a:pPr>
+            <a:r>
+              <a:rPr lang="en-US" sz="3200"/>
+              <a:t>	</a:t>
+            </a:r>
+            <a:r>
+              <a:rPr lang="en-US" sz="3200" smtClean="0"/>
+              <a:t>Đoàn </a:t>
+            </a:r>
+            <a:r>
+              <a:rPr lang="en-US" sz="3200"/>
+              <a:t>Chí Trọng</a:t>
+            </a:r>
+            <a:endParaRPr kumimoji="0" lang="en-US" sz="3200" b="0" i="0" u="none" strike="noStrike" kern="1200" cap="none" spc="0" normalizeH="0" baseline="0" noProof="0" dirty="0">
+              <a:ln>
+                <a:noFill/>
+              </a:ln>
+              <a:solidFill>
+                <a:schemeClr val="tx1"/>
+              </a:solidFill>
+              <a:effectLst/>
+              <a:uLnTx/>
+              <a:uFillTx/>
+              <a:latin typeface="+mn-lt"/>
+              <a:ea typeface="+mn-ea"/>
+              <a:cs typeface="+mn-cs"/>
+            </a:endParaRPr>
+          </a:p>
+        </p:txBody>
+      </p:sp>
+    </p:spTree>
+    <p:extLst>
+      <p:ext uri="{BB962C8B-B14F-4D97-AF65-F5344CB8AC3E}">
+        <p14:creationId xmlns:p14="http://schemas.microsoft.com/office/powerpoint/2010/main" val="4087084776"/>
+      </p:ext>
+    </p:extLst>
+  </p:cSld>
+  <p:clrMapOvr>
+    <a:masterClrMapping/>
+  </p:clrMapOvr>
+  <mc:AlternateContent xmlns:mc="http://schemas.openxmlformats.org/markup-compatibility/2006" xmlns:p14="http://schemas.microsoft.com/office/powerpoint/2010/main">
+    <mc:Choice Requires="p14">
+      <p:transition spd="slow" p14:dur="1500">
+        <p:split orient="vert"/>
+      </p:transition>
+    </mc:Choice>
+    <mc:Fallback xmlns="">
+      <p:transition spd="slow">
+        <p:split orient="vert"/>
+      </p:transition>
+    </mc:Fallback>
+  </mc:AlternateContent>
+  <p:timing>
+    <p:tnLst>
+      <p:par>
+        <p:cTn id="1" dur="indefinite" restart="never" nodeType="tmRoot"/>
+      </p:par>
+    </p:tnLst>
+  </p:timing>
+</p:sld>
+</file>
+
+<file path=ppt/slides/slide3.xml><?xml version="1.0" encoding="utf-8"?>
 <p:sld xmlns:a="http://schemas.openxmlformats.org/drawingml/2006/main" xmlns:r="http://schemas.openxmlformats.org/officeDocument/2006/relationships" xmlns:p="http://schemas.openxmlformats.org/presentationml/2006/main">
   <p:cSld>
     <p:spTree>
@@ -5955,7 +7427,7 @@
 </p:sld>
 </file>
 
-<file path=ppt/slides/slide3.xml><?xml version="1.0" encoding="utf-8"?>
+<file path=ppt/slides/slide4.xml><?xml version="1.0" encoding="utf-8"?>
 <p:sld xmlns:a="http://schemas.openxmlformats.org/drawingml/2006/main" xmlns:r="http://schemas.openxmlformats.org/officeDocument/2006/relationships" xmlns:p="http://schemas.openxmlformats.org/presentationml/2006/main">
   <p:cSld>
     <p:spTree>
@@ -6060,7 +7532,7 @@
           <p:cNvPr id="11" name="Rectangle: Rounded Corners 10">
             <a:extLst>
               <a:ext uri="{FF2B5EF4-FFF2-40B4-BE49-F238E27FC236}">
-                <a16:creationId xmlns:a16="http://schemas.microsoft.com/office/drawing/2014/main" xmlns="" id="{7B795FA9-A0AF-4330-851C-453F0AD60630}"/>
+                <a16:creationId xmlns="" xmlns:a16="http://schemas.microsoft.com/office/drawing/2014/main" id="{7B795FA9-A0AF-4330-851C-453F0AD60630}"/>
               </a:ext>
             </a:extLst>
           </p:cNvPr>
@@ -6229,7 +7701,7 @@
           <p:cNvPr id="13" name="Picture 12">
             <a:extLst>
               <a:ext uri="{FF2B5EF4-FFF2-40B4-BE49-F238E27FC236}">
-                <a16:creationId xmlns:a16="http://schemas.microsoft.com/office/drawing/2014/main" xmlns="" id="{3741F58D-FF06-4E22-8CB2-035E088FB4FF}"/>
+                <a16:creationId xmlns="" xmlns:a16="http://schemas.microsoft.com/office/drawing/2014/main" id="{3741F58D-FF06-4E22-8CB2-035E088FB4FF}"/>
               </a:ext>
             </a:extLst>
           </p:cNvPr>
@@ -6265,7 +7737,7 @@
           <p:cNvPr id="14" name="Rectangle: Rounded Corners 13">
             <a:extLst>
               <a:ext uri="{FF2B5EF4-FFF2-40B4-BE49-F238E27FC236}">
-                <a16:creationId xmlns:a16="http://schemas.microsoft.com/office/drawing/2014/main" xmlns="" id="{474CC18E-6375-4CF1-824D-D8E45CC5A1E3}"/>
+                <a16:creationId xmlns="" xmlns:a16="http://schemas.microsoft.com/office/drawing/2014/main" id="{474CC18E-6375-4CF1-824D-D8E45CC5A1E3}"/>
               </a:ext>
             </a:extLst>
           </p:cNvPr>
@@ -6381,7 +7853,7 @@
           <p:cNvPr id="16" name="Rounded Rectangle 5">
             <a:extLst>
               <a:ext uri="{FF2B5EF4-FFF2-40B4-BE49-F238E27FC236}">
-                <a16:creationId xmlns:a16="http://schemas.microsoft.com/office/drawing/2014/main" xmlns="" id="{2064FBA2-08BA-4ABB-AD3E-E3F47E997122}"/>
+                <a16:creationId xmlns="" xmlns:a16="http://schemas.microsoft.com/office/drawing/2014/main" id="{2064FBA2-08BA-4ABB-AD3E-E3F47E997122}"/>
               </a:ext>
             </a:extLst>
           </p:cNvPr>
@@ -6666,7 +8138,7 @@
 </p:sld>
 </file>
 
-<file path=ppt/slides/slide4.xml><?xml version="1.0" encoding="utf-8"?>
+<file path=ppt/slides/slide5.xml><?xml version="1.0" encoding="utf-8"?>
 <p:sld xmlns:a="http://schemas.openxmlformats.org/drawingml/2006/main" xmlns:r="http://schemas.openxmlformats.org/officeDocument/2006/relationships" xmlns:p="http://schemas.openxmlformats.org/presentationml/2006/main">
   <p:cSld>
     <p:spTree>
@@ -6688,7 +8160,7 @@
           <p:cNvPr id="3" name="Rectangle 2">
             <a:extLst>
               <a:ext uri="{FF2B5EF4-FFF2-40B4-BE49-F238E27FC236}">
-                <a16:creationId xmlns:a16="http://schemas.microsoft.com/office/drawing/2014/main" xmlns="" id="{659F84D9-9E34-4B50-962F-168BCC5B045B}"/>
+                <a16:creationId xmlns="" xmlns:a16="http://schemas.microsoft.com/office/drawing/2014/main" id="{659F84D9-9E34-4B50-962F-168BCC5B045B}"/>
               </a:ext>
             </a:extLst>
           </p:cNvPr>
@@ -6820,7 +8292,7 @@
           <p:cNvPr id="4" name="Arrow: Right 3">
             <a:extLst>
               <a:ext uri="{FF2B5EF4-FFF2-40B4-BE49-F238E27FC236}">
-                <a16:creationId xmlns:a16="http://schemas.microsoft.com/office/drawing/2014/main" xmlns="" id="{A6F72750-D8D5-4F0C-8142-74D9BDCC9D98}"/>
+                <a16:creationId xmlns="" xmlns:a16="http://schemas.microsoft.com/office/drawing/2014/main" id="{A6F72750-D8D5-4F0C-8142-74D9BDCC9D98}"/>
               </a:ext>
             </a:extLst>
           </p:cNvPr>
@@ -6876,7 +8348,7 @@
           <p:cNvPr id="5" name="Arrow: Right 4">
             <a:extLst>
               <a:ext uri="{FF2B5EF4-FFF2-40B4-BE49-F238E27FC236}">
-                <a16:creationId xmlns:a16="http://schemas.microsoft.com/office/drawing/2014/main" xmlns="" id="{5DA9F91F-6A9C-4C91-8972-DFECE108D052}"/>
+                <a16:creationId xmlns="" xmlns:a16="http://schemas.microsoft.com/office/drawing/2014/main" id="{5DA9F91F-6A9C-4C91-8972-DFECE108D052}"/>
               </a:ext>
             </a:extLst>
           </p:cNvPr>
@@ -7023,7 +8495,7 @@
           <p:cNvPr id="6" name="Arrow: Right 5">
             <a:extLst>
               <a:ext uri="{FF2B5EF4-FFF2-40B4-BE49-F238E27FC236}">
-                <a16:creationId xmlns:a16="http://schemas.microsoft.com/office/drawing/2014/main" xmlns="" id="{8063E056-9D1B-4FA3-B3AC-FE364F82FE1E}"/>
+                <a16:creationId xmlns="" xmlns:a16="http://schemas.microsoft.com/office/drawing/2014/main" id="{8063E056-9D1B-4FA3-B3AC-FE364F82FE1E}"/>
               </a:ext>
             </a:extLst>
           </p:cNvPr>
@@ -7298,7 +8770,7 @@
           <p:cNvPr id="7" name="Rectangle 6">
             <a:extLst>
               <a:ext uri="{FF2B5EF4-FFF2-40B4-BE49-F238E27FC236}">
-                <a16:creationId xmlns:a16="http://schemas.microsoft.com/office/drawing/2014/main" xmlns="" id="{1F948868-FEBE-4C86-BD5D-2AD18853701E}"/>
+                <a16:creationId xmlns="" xmlns:a16="http://schemas.microsoft.com/office/drawing/2014/main" id="{1F948868-FEBE-4C86-BD5D-2AD18853701E}"/>
               </a:ext>
             </a:extLst>
           </p:cNvPr>
@@ -7913,7 +9385,7 @@
 </p:sld>
 </file>
 
-<file path=ppt/slides/slide5.xml><?xml version="1.0" encoding="utf-8"?>
+<file path=ppt/slides/slide6.xml><?xml version="1.0" encoding="utf-8"?>
 <p:sld xmlns:a="http://schemas.openxmlformats.org/drawingml/2006/main" xmlns:r="http://schemas.openxmlformats.org/officeDocument/2006/relationships" xmlns:p="http://schemas.openxmlformats.org/presentationml/2006/main">
   <p:cSld>
     <p:spTree>
@@ -8042,7 +9514,7 @@
           <p:cNvPr id="7" name="Rectangle 6">
             <a:extLst>
               <a:ext uri="{FF2B5EF4-FFF2-40B4-BE49-F238E27FC236}">
-                <a16:creationId xmlns:a16="http://schemas.microsoft.com/office/drawing/2014/main" xmlns="" id="{90E817E1-1A46-4E2C-B7BA-F5294045D6DF}"/>
+                <a16:creationId xmlns="" xmlns:a16="http://schemas.microsoft.com/office/drawing/2014/main" id="{90E817E1-1A46-4E2C-B7BA-F5294045D6DF}"/>
               </a:ext>
             </a:extLst>
           </p:cNvPr>
@@ -8081,7 +9553,7 @@
           <p:cNvPr id="8" name="Oval 7">
             <a:extLst>
               <a:ext uri="{FF2B5EF4-FFF2-40B4-BE49-F238E27FC236}">
-                <a16:creationId xmlns:a16="http://schemas.microsoft.com/office/drawing/2014/main" xmlns="" id="{CF70C069-EA62-4C21-8790-43B1EC9714C1}"/>
+                <a16:creationId xmlns="" xmlns:a16="http://schemas.microsoft.com/office/drawing/2014/main" id="{CF70C069-EA62-4C21-8790-43B1EC9714C1}"/>
               </a:ext>
             </a:extLst>
           </p:cNvPr>
@@ -8142,7 +9614,7 @@
           <p:cNvPr id="10" name="Rounded Rectangle 5">
             <a:extLst>
               <a:ext uri="{FF2B5EF4-FFF2-40B4-BE49-F238E27FC236}">
-                <a16:creationId xmlns:a16="http://schemas.microsoft.com/office/drawing/2014/main" xmlns="" id="{9CB07055-457C-4852-B3FB-6BEEE01B71EA}"/>
+                <a16:creationId xmlns="" xmlns:a16="http://schemas.microsoft.com/office/drawing/2014/main" id="{9CB07055-457C-4852-B3FB-6BEEE01B71EA}"/>
               </a:ext>
             </a:extLst>
           </p:cNvPr>
@@ -8341,7 +9813,7 @@
 </p:sld>
 </file>
 
-<file path=ppt/slides/slide6.xml><?xml version="1.0" encoding="utf-8"?>
+<file path=ppt/slides/slide7.xml><?xml version="1.0" encoding="utf-8"?>
 <p:sld xmlns:a="http://schemas.openxmlformats.org/drawingml/2006/main" xmlns:r="http://schemas.openxmlformats.org/officeDocument/2006/relationships" xmlns:p="http://schemas.openxmlformats.org/presentationml/2006/main">
   <p:cSld>
     <p:spTree>
@@ -8363,7 +9835,7 @@
           <p:cNvPr id="3" name="Arrow: Right 2">
             <a:extLst>
               <a:ext uri="{FF2B5EF4-FFF2-40B4-BE49-F238E27FC236}">
-                <a16:creationId xmlns:a16="http://schemas.microsoft.com/office/drawing/2014/main" xmlns="" id="{DE0E88C0-4164-4A49-8ED9-E93E40BFD85B}"/>
+                <a16:creationId xmlns="" xmlns:a16="http://schemas.microsoft.com/office/drawing/2014/main" id="{DE0E88C0-4164-4A49-8ED9-E93E40BFD85B}"/>
               </a:ext>
             </a:extLst>
           </p:cNvPr>
@@ -8419,7 +9891,7 @@
           <p:cNvPr id="5" name="Picture 4">
             <a:extLst>
               <a:ext uri="{FF2B5EF4-FFF2-40B4-BE49-F238E27FC236}">
-                <a16:creationId xmlns:a16="http://schemas.microsoft.com/office/drawing/2014/main" xmlns="" id="{8E458D2A-A7E7-49A7-AB2B-739ED9CCBD05}"/>
+                <a16:creationId xmlns="" xmlns:a16="http://schemas.microsoft.com/office/drawing/2014/main" id="{8E458D2A-A7E7-49A7-AB2B-739ED9CCBD05}"/>
               </a:ext>
             </a:extLst>
           </p:cNvPr>
@@ -8455,7 +9927,7 @@
           <p:cNvPr id="6" name="Rectangle 5">
             <a:extLst>
               <a:ext uri="{FF2B5EF4-FFF2-40B4-BE49-F238E27FC236}">
-                <a16:creationId xmlns:a16="http://schemas.microsoft.com/office/drawing/2014/main" xmlns="" id="{6DA013C3-3C7B-4166-B5DA-4AE9CA15C347}"/>
+                <a16:creationId xmlns="" xmlns:a16="http://schemas.microsoft.com/office/drawing/2014/main" id="{6DA013C3-3C7B-4166-B5DA-4AE9CA15C347}"/>
               </a:ext>
             </a:extLst>
           </p:cNvPr>
@@ -8601,7 +10073,7 @@
           <p:cNvPr id="7" name="Rectangular Callout 4">
             <a:extLst>
               <a:ext uri="{FF2B5EF4-FFF2-40B4-BE49-F238E27FC236}">
-                <a16:creationId xmlns:a16="http://schemas.microsoft.com/office/drawing/2014/main" xmlns="" id="{238E074D-F8AB-451A-9AA6-AD3E1705ACE2}"/>
+                <a16:creationId xmlns="" xmlns:a16="http://schemas.microsoft.com/office/drawing/2014/main" id="{238E074D-F8AB-451A-9AA6-AD3E1705ACE2}"/>
               </a:ext>
             </a:extLst>
           </p:cNvPr>
@@ -8870,7 +10342,7 @@
 </p:sld>
 </file>
 
-<file path=ppt/slides/slide7.xml><?xml version="1.0" encoding="utf-8"?>
+<file path=ppt/slides/slide8.xml><?xml version="1.0" encoding="utf-8"?>
 <p:sld xmlns:a="http://schemas.openxmlformats.org/drawingml/2006/main" xmlns:r="http://schemas.openxmlformats.org/officeDocument/2006/relationships" xmlns:p="http://schemas.openxmlformats.org/presentationml/2006/main">
   <p:cSld>
     <p:spTree>
@@ -8892,7 +10364,7 @@
           <p:cNvPr id="2" name="Rectangle 1">
             <a:extLst>
               <a:ext uri="{FF2B5EF4-FFF2-40B4-BE49-F238E27FC236}">
-                <a16:creationId xmlns:a16="http://schemas.microsoft.com/office/drawing/2014/main" xmlns="" id="{4453D4E0-1673-428F-96BD-7AB6575B874D}"/>
+                <a16:creationId xmlns="" xmlns:a16="http://schemas.microsoft.com/office/drawing/2014/main" id="{4453D4E0-1673-428F-96BD-7AB6575B874D}"/>
               </a:ext>
             </a:extLst>
           </p:cNvPr>
@@ -9011,7 +10483,7 @@
           <p:cNvPr id="4" name="Rectangle: Rounded Corners 3">
             <a:extLst>
               <a:ext uri="{FF2B5EF4-FFF2-40B4-BE49-F238E27FC236}">
-                <a16:creationId xmlns:a16="http://schemas.microsoft.com/office/drawing/2014/main" xmlns="" id="{E320D58F-D8C0-4249-BBD1-7B357F8DAF84}"/>
+                <a16:creationId xmlns="" xmlns:a16="http://schemas.microsoft.com/office/drawing/2014/main" id="{E320D58F-D8C0-4249-BBD1-7B357F8DAF84}"/>
               </a:ext>
             </a:extLst>
           </p:cNvPr>
@@ -9062,7 +10534,7 @@
           <p:cNvPr id="6" name="Picture 5">
             <a:extLst>
               <a:ext uri="{FF2B5EF4-FFF2-40B4-BE49-F238E27FC236}">
-                <a16:creationId xmlns:a16="http://schemas.microsoft.com/office/drawing/2014/main" xmlns="" id="{F604E801-680C-4456-9184-66C7D010A1E2}"/>
+                <a16:creationId xmlns="" xmlns:a16="http://schemas.microsoft.com/office/drawing/2014/main" id="{F604E801-680C-4456-9184-66C7D010A1E2}"/>
               </a:ext>
             </a:extLst>
           </p:cNvPr>
@@ -9098,7 +10570,7 @@
           <p:cNvPr id="7" name="Picture 6">
             <a:extLst>
               <a:ext uri="{FF2B5EF4-FFF2-40B4-BE49-F238E27FC236}">
-                <a16:creationId xmlns:a16="http://schemas.microsoft.com/office/drawing/2014/main" xmlns="" id="{CBC0691D-4033-4B17-921F-4EACDA315FB5}"/>
+                <a16:creationId xmlns="" xmlns:a16="http://schemas.microsoft.com/office/drawing/2014/main" id="{CBC0691D-4033-4B17-921F-4EACDA315FB5}"/>
               </a:ext>
             </a:extLst>
           </p:cNvPr>
@@ -9372,7 +10844,7 @@
 </p:sld>
 </file>
 
-<file path=ppt/slides/slide8.xml><?xml version="1.0" encoding="utf-8"?>
+<file path=ppt/slides/slide9.xml><?xml version="1.0" encoding="utf-8"?>
 <p:sld xmlns:a="http://schemas.openxmlformats.org/drawingml/2006/main" xmlns:r="http://schemas.openxmlformats.org/officeDocument/2006/relationships" xmlns:p="http://schemas.openxmlformats.org/presentationml/2006/main">
   <p:cSld>
     <p:spTree>
@@ -9394,7 +10866,7 @@
           <p:cNvPr id="2" name="Rounded Rectangle 7">
             <a:extLst>
               <a:ext uri="{FF2B5EF4-FFF2-40B4-BE49-F238E27FC236}">
-                <a16:creationId xmlns:a16="http://schemas.microsoft.com/office/drawing/2014/main" xmlns="" id="{C1BA61DC-0E0F-4572-9AF7-98969D7E6215}"/>
+                <a16:creationId xmlns="" xmlns:a16="http://schemas.microsoft.com/office/drawing/2014/main" id="{C1BA61DC-0E0F-4572-9AF7-98969D7E6215}"/>
               </a:ext>
             </a:extLst>
           </p:cNvPr>
@@ -9460,7 +10932,7 @@
           <p:cNvPr id="3" name="Rectangular Callout 4">
             <a:extLst>
               <a:ext uri="{FF2B5EF4-FFF2-40B4-BE49-F238E27FC236}">
-                <a16:creationId xmlns:a16="http://schemas.microsoft.com/office/drawing/2014/main" xmlns="" id="{4B58C8E1-E9BE-40D0-AE2B-BDD102A46E26}"/>
+                <a16:creationId xmlns="" xmlns:a16="http://schemas.microsoft.com/office/drawing/2014/main" id="{4B58C8E1-E9BE-40D0-AE2B-BDD102A46E26}"/>
               </a:ext>
             </a:extLst>
           </p:cNvPr>
@@ -9518,7 +10990,7 @@
           <p:cNvPr id="5" name="Rectangle: Rounded Corners 4">
             <a:extLst>
               <a:ext uri="{FF2B5EF4-FFF2-40B4-BE49-F238E27FC236}">
-                <a16:creationId xmlns:a16="http://schemas.microsoft.com/office/drawing/2014/main" xmlns="" id="{39602950-F53F-4377-AEE6-787549BA4EDF}"/>
+                <a16:creationId xmlns="" xmlns:a16="http://schemas.microsoft.com/office/drawing/2014/main" id="{39602950-F53F-4377-AEE6-787549BA4EDF}"/>
               </a:ext>
             </a:extLst>
           </p:cNvPr>
@@ -9830,7 +11302,7 @@
           <p:cNvPr id="4" name="Oval 3">
             <a:extLst>
               <a:ext uri="{FF2B5EF4-FFF2-40B4-BE49-F238E27FC236}">
-                <a16:creationId xmlns:a16="http://schemas.microsoft.com/office/drawing/2014/main" xmlns="" id="{5D029AE3-D018-45CE-9838-E708C8FC6964}"/>
+                <a16:creationId xmlns="" xmlns:a16="http://schemas.microsoft.com/office/drawing/2014/main" id="{5D029AE3-D018-45CE-9838-E708C8FC6964}"/>
               </a:ext>
             </a:extLst>
           </p:cNvPr>
@@ -10023,7 +11495,7 @@
           <p:cNvPr id="11" name="Oval 10">
             <a:extLst>
               <a:ext uri="{FF2B5EF4-FFF2-40B4-BE49-F238E27FC236}">
-                <a16:creationId xmlns:a16="http://schemas.microsoft.com/office/drawing/2014/main" xmlns="" id="{8655DE2C-40ED-4CE9-B9BD-2BCB6D1D7D4B}"/>
+                <a16:creationId xmlns="" xmlns:a16="http://schemas.microsoft.com/office/drawing/2014/main" id="{8655DE2C-40ED-4CE9-B9BD-2BCB6D1D7D4B}"/>
               </a:ext>
             </a:extLst>
           </p:cNvPr>
@@ -10244,7 +11716,7 @@
           <p:cNvPr id="12" name="Oval 11">
             <a:extLst>
               <a:ext uri="{FF2B5EF4-FFF2-40B4-BE49-F238E27FC236}">
-                <a16:creationId xmlns:a16="http://schemas.microsoft.com/office/drawing/2014/main" xmlns="" id="{173F2D70-4EB8-4A7B-9966-C4AC0A1E993B}"/>
+                <a16:creationId xmlns="" xmlns:a16="http://schemas.microsoft.com/office/drawing/2014/main" id="{173F2D70-4EB8-4A7B-9966-C4AC0A1E993B}"/>
               </a:ext>
             </a:extLst>
           </p:cNvPr>
@@ -10553,782 +12025,6 @@
 </p:sld>
 </file>
 
-<file path=ppt/slides/slide9.xml><?xml version="1.0" encoding="utf-8"?>
-<p:sld xmlns:a="http://schemas.openxmlformats.org/drawingml/2006/main" xmlns:r="http://schemas.openxmlformats.org/officeDocument/2006/relationships" xmlns:p="http://schemas.openxmlformats.org/presentationml/2006/main">
-  <p:cSld>
-    <p:spTree>
-      <p:nvGrpSpPr>
-        <p:cNvPr id="1" name=""/>
-        <p:cNvGrpSpPr/>
-        <p:nvPr/>
-      </p:nvGrpSpPr>
-      <p:grpSpPr>
-        <a:xfrm>
-          <a:off x="0" y="0"/>
-          <a:ext cx="0" cy="0"/>
-          <a:chOff x="0" y="0"/>
-          <a:chExt cx="0" cy="0"/>
-        </a:xfrm>
-      </p:grpSpPr>
-      <p:sp>
-        <p:nvSpPr>
-          <p:cNvPr id="2" name="Rounded Rectangle 7">
-            <a:extLst>
-              <a:ext uri="{FF2B5EF4-FFF2-40B4-BE49-F238E27FC236}">
-                <a16:creationId xmlns:a16="http://schemas.microsoft.com/office/drawing/2014/main" xmlns="" id="{509CC8F0-9BCC-4C53-9CE1-463CC7B19C06}"/>
-              </a:ext>
-            </a:extLst>
-          </p:cNvPr>
-          <p:cNvSpPr/>
-          <p:nvPr/>
-        </p:nvSpPr>
-        <p:spPr>
-          <a:xfrm>
-            <a:off x="152400" y="169398"/>
-            <a:ext cx="5181600" cy="533400"/>
-          </a:xfrm>
-          <a:prstGeom prst="roundRect">
-            <a:avLst/>
-          </a:prstGeom>
-          <a:solidFill>
-            <a:schemeClr val="accent2">
-              <a:lumMod val="20000"/>
-              <a:lumOff val="80000"/>
-            </a:schemeClr>
-          </a:solidFill>
-          <a:ln>
-            <a:solidFill>
-              <a:schemeClr val="tx2"/>
-            </a:solidFill>
-          </a:ln>
-        </p:spPr>
-        <p:style>
-          <a:lnRef idx="2">
-            <a:schemeClr val="accent1">
-              <a:shade val="50000"/>
-            </a:schemeClr>
-          </a:lnRef>
-          <a:fillRef idx="1">
-            <a:schemeClr val="accent1"/>
-          </a:fillRef>
-          <a:effectRef idx="0">
-            <a:schemeClr val="accent1"/>
-          </a:effectRef>
-          <a:fontRef idx="minor">
-            <a:schemeClr val="lt1"/>
-          </a:fontRef>
-        </p:style>
-        <p:txBody>
-          <a:bodyPr rtlCol="0" anchor="ctr"/>
-          <a:lstStyle/>
-          <a:p>
-            <a:pPr algn="ctr"/>
-            <a:r>
-              <a:rPr lang="en-US" dirty="0">
-                <a:solidFill>
-                  <a:schemeClr val="tx1"/>
-                </a:solidFill>
-                <a:latin typeface="Times New Roman" pitchFamily="18" charset="0"/>
-                <a:cs typeface="Times New Roman" pitchFamily="18" charset="0"/>
-              </a:rPr>
-              <a:t>H</a:t>
-            </a:r>
-            <a:r>
-              <a:rPr lang="vi-VN" dirty="0">
-                <a:solidFill>
-                  <a:schemeClr val="tx1"/>
-                </a:solidFill>
-                <a:latin typeface="Times New Roman" pitchFamily="18" charset="0"/>
-                <a:cs typeface="Times New Roman" pitchFamily="18" charset="0"/>
-              </a:rPr>
-              <a:t>Ư</a:t>
-            </a:r>
-            <a:r>
-              <a:rPr lang="en-US" dirty="0">
-                <a:solidFill>
-                  <a:schemeClr val="tx1"/>
-                </a:solidFill>
-                <a:latin typeface="Times New Roman" pitchFamily="18" charset="0"/>
-                <a:cs typeface="Times New Roman" pitchFamily="18" charset="0"/>
-              </a:rPr>
-              <a:t>ỚNG DẪN SỬ DỤNG  </a:t>
-            </a:r>
-          </a:p>
-        </p:txBody>
-      </p:sp>
-      <p:sp>
-        <p:nvSpPr>
-          <p:cNvPr id="3" name="Rectangle: Rounded Corners 2">
-            <a:extLst>
-              <a:ext uri="{FF2B5EF4-FFF2-40B4-BE49-F238E27FC236}">
-                <a16:creationId xmlns:a16="http://schemas.microsoft.com/office/drawing/2014/main" xmlns="" id="{E7181887-6331-49AD-AFDC-C8E53F3D57BC}"/>
-              </a:ext>
-            </a:extLst>
-          </p:cNvPr>
-          <p:cNvSpPr/>
-          <p:nvPr/>
-        </p:nvSpPr>
-        <p:spPr>
-          <a:xfrm>
-            <a:off x="1528689" y="980270"/>
-            <a:ext cx="6705600" cy="607842"/>
-          </a:xfrm>
-          <a:prstGeom prst="roundRect">
-            <a:avLst/>
-          </a:prstGeom>
-        </p:spPr>
-        <p:style>
-          <a:lnRef idx="2">
-            <a:schemeClr val="accent1"/>
-          </a:lnRef>
-          <a:fillRef idx="1">
-            <a:schemeClr val="lt1"/>
-          </a:fillRef>
-          <a:effectRef idx="0">
-            <a:schemeClr val="accent1"/>
-          </a:effectRef>
-          <a:fontRef idx="minor">
-            <a:schemeClr val="dk1"/>
-          </a:fontRef>
-        </p:style>
-        <p:txBody>
-          <a:bodyPr rtlCol="0" anchor="ctr"/>
-          <a:lstStyle/>
-          <a:p>
-            <a:r>
-              <a:rPr lang="en-US" b="1" dirty="0"/>
-              <a:t>1. </a:t>
-            </a:r>
-            <a:r>
-              <a:rPr lang="en-US" b="1" dirty="0" err="1"/>
-              <a:t>Đăng</a:t>
-            </a:r>
-            <a:r>
-              <a:rPr lang="en-US" b="1" dirty="0"/>
-              <a:t> </a:t>
-            </a:r>
-            <a:r>
-              <a:rPr lang="en-US" b="1" dirty="0" err="1"/>
-              <a:t>ký</a:t>
-            </a:r>
-            <a:r>
-              <a:rPr lang="en-US" b="1" dirty="0"/>
-              <a:t> </a:t>
-            </a:r>
-            <a:r>
-              <a:rPr lang="en-US" b="1" dirty="0" err="1"/>
-              <a:t>tài</a:t>
-            </a:r>
-            <a:r>
-              <a:rPr lang="en-US" b="1" dirty="0"/>
-              <a:t> </a:t>
-            </a:r>
-            <a:r>
-              <a:rPr lang="en-US" b="1" dirty="0" err="1"/>
-              <a:t>khoản</a:t>
-            </a:r>
-            <a:r>
-              <a:rPr lang="en-US" b="1" dirty="0"/>
-              <a:t> GitHub </a:t>
-            </a:r>
-            <a:r>
-              <a:rPr lang="en-US" dirty="0" err="1"/>
-              <a:t>tại</a:t>
-            </a:r>
-            <a:r>
-              <a:rPr lang="en-US" dirty="0"/>
-              <a:t> </a:t>
-            </a:r>
-            <a:r>
-              <a:rPr lang="en-US" dirty="0">
-                <a:hlinkClick r:id="rId2"/>
-              </a:rPr>
-              <a:t>http://github.com</a:t>
-            </a:r>
-            <a:endParaRPr lang="en-US" dirty="0"/>
-          </a:p>
-        </p:txBody>
-      </p:sp>
-      <p:sp>
-        <p:nvSpPr>
-          <p:cNvPr id="4" name="Rectangle: Rounded Corners 3">
-            <a:extLst>
-              <a:ext uri="{FF2B5EF4-FFF2-40B4-BE49-F238E27FC236}">
-                <a16:creationId xmlns:a16="http://schemas.microsoft.com/office/drawing/2014/main" xmlns="" id="{718F25A0-5D3F-4194-9A31-4C6C3F4D8C7B}"/>
-              </a:ext>
-            </a:extLst>
-          </p:cNvPr>
-          <p:cNvSpPr/>
-          <p:nvPr/>
-        </p:nvSpPr>
-        <p:spPr>
-          <a:xfrm>
-            <a:off x="1513449" y="1797624"/>
-            <a:ext cx="6700911" cy="1196340"/>
-          </a:xfrm>
-          <a:prstGeom prst="roundRect">
-            <a:avLst/>
-          </a:prstGeom>
-        </p:spPr>
-        <p:style>
-          <a:lnRef idx="2">
-            <a:schemeClr val="accent1"/>
-          </a:lnRef>
-          <a:fillRef idx="1">
-            <a:schemeClr val="lt1"/>
-          </a:fillRef>
-          <a:effectRef idx="0">
-            <a:schemeClr val="accent1"/>
-          </a:effectRef>
-          <a:fontRef idx="minor">
-            <a:schemeClr val="dk1"/>
-          </a:fontRef>
-        </p:style>
-        <p:txBody>
-          <a:bodyPr rtlCol="0" anchor="ctr"/>
-          <a:lstStyle/>
-          <a:p>
-            <a:r>
-              <a:rPr lang="en-US" b="1" dirty="0"/>
-              <a:t>2. Download </a:t>
-            </a:r>
-            <a:r>
-              <a:rPr lang="en-US" b="1" dirty="0" err="1"/>
-              <a:t>và</a:t>
-            </a:r>
-            <a:r>
-              <a:rPr lang="en-US" b="1" dirty="0"/>
-              <a:t> </a:t>
-            </a:r>
-            <a:r>
-              <a:rPr lang="en-US" b="1" dirty="0" err="1"/>
-              <a:t>cài</a:t>
-            </a:r>
-            <a:r>
-              <a:rPr lang="en-US" b="1" dirty="0"/>
-              <a:t> </a:t>
-            </a:r>
-            <a:r>
-              <a:rPr lang="en-US" b="1" dirty="0" err="1"/>
-              <a:t>đặt</a:t>
-            </a:r>
-            <a:r>
-              <a:rPr lang="en-US" b="1" dirty="0"/>
-              <a:t> </a:t>
-            </a:r>
-            <a:r>
-              <a:rPr lang="en-US" b="1" dirty="0" err="1"/>
-              <a:t>công</a:t>
-            </a:r>
-            <a:r>
-              <a:rPr lang="en-US" b="1" dirty="0"/>
-              <a:t> </a:t>
-            </a:r>
-            <a:r>
-              <a:rPr lang="en-US" b="1" dirty="0" err="1"/>
-              <a:t>cụ</a:t>
-            </a:r>
-            <a:r>
-              <a:rPr lang="en-US" b="1" dirty="0"/>
-              <a:t> Git :</a:t>
-            </a:r>
-          </a:p>
-          <a:p>
-            <a:r>
-              <a:rPr lang="en-US" dirty="0"/>
-              <a:t> </a:t>
-            </a:r>
-          </a:p>
-          <a:p>
-            <a:r>
-              <a:rPr lang="en-US" dirty="0"/>
-              <a:t>	Download </a:t>
-            </a:r>
-            <a:r>
-              <a:rPr lang="en-US" dirty="0" err="1"/>
-              <a:t>tại</a:t>
-            </a:r>
-            <a:r>
-              <a:rPr lang="en-US" dirty="0"/>
-              <a:t> : </a:t>
-            </a:r>
-            <a:r>
-              <a:rPr lang="en-US" dirty="0">
-                <a:hlinkClick r:id="rId3"/>
-              </a:rPr>
-              <a:t>http://git-scm.com/download</a:t>
-            </a:r>
-            <a:endParaRPr lang="en-US" dirty="0"/>
-          </a:p>
-          <a:p>
-            <a:endParaRPr lang="en-US" dirty="0"/>
-          </a:p>
-        </p:txBody>
-      </p:sp>
-      <p:sp>
-        <p:nvSpPr>
-          <p:cNvPr id="5" name="Rectangle: Rounded Corners 4">
-            <a:extLst>
-              <a:ext uri="{FF2B5EF4-FFF2-40B4-BE49-F238E27FC236}">
-                <a16:creationId xmlns:a16="http://schemas.microsoft.com/office/drawing/2014/main" xmlns="" id="{8524485D-D529-4461-90B0-6C5D2FFEB2F0}"/>
-              </a:ext>
-            </a:extLst>
-          </p:cNvPr>
-          <p:cNvSpPr/>
-          <p:nvPr/>
-        </p:nvSpPr>
-        <p:spPr>
-          <a:xfrm>
-            <a:off x="1524000" y="3203476"/>
-            <a:ext cx="6705600" cy="1025698"/>
-          </a:xfrm>
-          <a:prstGeom prst="roundRect">
-            <a:avLst/>
-          </a:prstGeom>
-        </p:spPr>
-        <p:style>
-          <a:lnRef idx="2">
-            <a:schemeClr val="accent1"/>
-          </a:lnRef>
-          <a:fillRef idx="1">
-            <a:schemeClr val="lt1"/>
-          </a:fillRef>
-          <a:effectRef idx="0">
-            <a:schemeClr val="accent1"/>
-          </a:effectRef>
-          <a:fontRef idx="minor">
-            <a:schemeClr val="dk1"/>
-          </a:fontRef>
-        </p:style>
-        <p:txBody>
-          <a:bodyPr rtlCol="0" anchor="ctr"/>
-          <a:lstStyle/>
-          <a:p>
-            <a:r>
-              <a:rPr lang="en-US" b="1" dirty="0"/>
-              <a:t>3</a:t>
-            </a:r>
-            <a:r>
-              <a:rPr lang="en-US" dirty="0"/>
-              <a:t>.</a:t>
-            </a:r>
-            <a:r>
-              <a:rPr lang="en-US" b="1" dirty="0"/>
-              <a:t>Tạo SSH Key </a:t>
-            </a:r>
-            <a:r>
-              <a:rPr lang="en-US" dirty="0"/>
-              <a:t>: SSH Key </a:t>
-            </a:r>
-            <a:r>
-              <a:rPr lang="en-US" dirty="0" err="1"/>
-              <a:t>là</a:t>
-            </a:r>
-            <a:r>
-              <a:rPr lang="en-US" dirty="0"/>
-              <a:t> </a:t>
-            </a:r>
-            <a:r>
-              <a:rPr lang="en-US" dirty="0" err="1"/>
-              <a:t>một</a:t>
-            </a:r>
-            <a:r>
-              <a:rPr lang="en-US" dirty="0"/>
-              <a:t> </a:t>
-            </a:r>
-            <a:r>
-              <a:rPr lang="en-US" dirty="0" err="1"/>
-              <a:t>mã</a:t>
-            </a:r>
-            <a:r>
-              <a:rPr lang="en-US" dirty="0"/>
-              <a:t> </a:t>
-            </a:r>
-            <a:r>
-              <a:rPr lang="en-US" dirty="0" err="1"/>
-              <a:t>chứng</a:t>
-            </a:r>
-            <a:r>
-              <a:rPr lang="en-US" dirty="0"/>
-              <a:t> </a:t>
-            </a:r>
-            <a:r>
-              <a:rPr lang="en-US" dirty="0" err="1"/>
-              <a:t>nhận</a:t>
-            </a:r>
-            <a:r>
-              <a:rPr lang="en-US" dirty="0"/>
-              <a:t> </a:t>
-            </a:r>
-            <a:r>
-              <a:rPr lang="en-US" dirty="0" err="1"/>
-              <a:t>để</a:t>
-            </a:r>
-            <a:r>
-              <a:rPr lang="en-US" dirty="0"/>
-              <a:t> </a:t>
-            </a:r>
-            <a:r>
-              <a:rPr lang="en-US" dirty="0" err="1"/>
-              <a:t>bạn</a:t>
-            </a:r>
-            <a:r>
-              <a:rPr lang="en-US" dirty="0"/>
-              <a:t> </a:t>
-            </a:r>
-            <a:r>
-              <a:rPr lang="en-US" dirty="0" err="1"/>
-              <a:t>có</a:t>
-            </a:r>
-            <a:r>
-              <a:rPr lang="en-US" dirty="0"/>
-              <a:t> </a:t>
-            </a:r>
-            <a:r>
-              <a:rPr lang="en-US" dirty="0" err="1"/>
-              <a:t>quyền</a:t>
-            </a:r>
-            <a:r>
-              <a:rPr lang="en-US" dirty="0"/>
-              <a:t> </a:t>
-            </a:r>
-            <a:r>
-              <a:rPr lang="en-US" dirty="0" err="1"/>
-              <a:t>thao</a:t>
-            </a:r>
-            <a:r>
-              <a:rPr lang="en-US" dirty="0"/>
-              <a:t> </a:t>
-            </a:r>
-            <a:r>
-              <a:rPr lang="en-US" dirty="0" err="1"/>
-              <a:t>tác</a:t>
-            </a:r>
-            <a:r>
-              <a:rPr lang="en-US" dirty="0"/>
-              <a:t> </a:t>
-            </a:r>
-            <a:r>
-              <a:rPr lang="en-US" dirty="0" err="1"/>
-              <a:t>trên</a:t>
-            </a:r>
-            <a:r>
-              <a:rPr lang="en-US" dirty="0"/>
-              <a:t> repository </a:t>
-            </a:r>
-            <a:r>
-              <a:rPr lang="en-US" dirty="0" err="1"/>
-              <a:t>của</a:t>
-            </a:r>
-            <a:r>
-              <a:rPr lang="en-US" dirty="0"/>
-              <a:t> GitHub, SSH Key </a:t>
-            </a:r>
-            <a:r>
-              <a:rPr lang="en-US" dirty="0" err="1"/>
-              <a:t>sẽ</a:t>
-            </a:r>
-            <a:r>
-              <a:rPr lang="en-US" dirty="0"/>
-              <a:t> </a:t>
-            </a:r>
-            <a:r>
-              <a:rPr lang="en-US" dirty="0" err="1"/>
-              <a:t>mang</a:t>
-            </a:r>
-            <a:r>
-              <a:rPr lang="en-US" dirty="0"/>
-              <a:t> </a:t>
-            </a:r>
-            <a:r>
-              <a:rPr lang="en-US" dirty="0" err="1"/>
-              <a:t>tất</a:t>
-            </a:r>
-            <a:r>
-              <a:rPr lang="en-US" dirty="0"/>
-              <a:t> </a:t>
-            </a:r>
-            <a:r>
-              <a:rPr lang="en-US" dirty="0" err="1"/>
-              <a:t>cả</a:t>
-            </a:r>
-            <a:r>
-              <a:rPr lang="en-US" dirty="0"/>
-              <a:t> </a:t>
-            </a:r>
-            <a:r>
-              <a:rPr lang="en-US" dirty="0" err="1"/>
-              <a:t>thông</a:t>
-            </a:r>
-            <a:r>
-              <a:rPr lang="en-US" dirty="0"/>
-              <a:t> tin </a:t>
-            </a:r>
-            <a:r>
-              <a:rPr lang="en-US" dirty="0" err="1"/>
-              <a:t>về</a:t>
-            </a:r>
-            <a:r>
-              <a:rPr lang="en-US" dirty="0"/>
-              <a:t> account </a:t>
-            </a:r>
-            <a:r>
-              <a:rPr lang="en-US" dirty="0" err="1"/>
-              <a:t>của</a:t>
-            </a:r>
-            <a:r>
-              <a:rPr lang="en-US" dirty="0"/>
-              <a:t> </a:t>
-            </a:r>
-            <a:r>
-              <a:rPr lang="en-US" dirty="0" err="1"/>
-              <a:t>bạn</a:t>
-            </a:r>
-            <a:r>
-              <a:rPr lang="en-US" dirty="0"/>
-              <a:t>.</a:t>
-            </a:r>
-          </a:p>
-        </p:txBody>
-      </p:sp>
-      <p:sp>
-        <p:nvSpPr>
-          <p:cNvPr id="7" name="Rectangle: Rounded Corners 6">
-            <a:extLst>
-              <a:ext uri="{FF2B5EF4-FFF2-40B4-BE49-F238E27FC236}">
-                <a16:creationId xmlns:a16="http://schemas.microsoft.com/office/drawing/2014/main" xmlns="" id="{BA277D66-98E7-47B2-A2E9-35046D1CE172}"/>
-              </a:ext>
-            </a:extLst>
-          </p:cNvPr>
-          <p:cNvSpPr/>
-          <p:nvPr/>
-        </p:nvSpPr>
-        <p:spPr>
-          <a:xfrm>
-            <a:off x="1524000" y="4648199"/>
-            <a:ext cx="6705600" cy="868609"/>
-          </a:xfrm>
-          <a:prstGeom prst="roundRect">
-            <a:avLst/>
-          </a:prstGeom>
-        </p:spPr>
-        <p:style>
-          <a:lnRef idx="2">
-            <a:schemeClr val="accent1"/>
-          </a:lnRef>
-          <a:fillRef idx="1">
-            <a:schemeClr val="lt1"/>
-          </a:fillRef>
-          <a:effectRef idx="0">
-            <a:schemeClr val="accent1"/>
-          </a:effectRef>
-          <a:fontRef idx="minor">
-            <a:schemeClr val="dk1"/>
-          </a:fontRef>
-        </p:style>
-        <p:txBody>
-          <a:bodyPr rtlCol="0" anchor="ctr"/>
-          <a:lstStyle/>
-          <a:p>
-            <a:r>
-              <a:rPr lang="en-US" b="1" dirty="0"/>
-              <a:t>4. </a:t>
-            </a:r>
-            <a:r>
-              <a:rPr lang="en-US" b="1" dirty="0" err="1"/>
-              <a:t>Tạo</a:t>
-            </a:r>
-            <a:r>
-              <a:rPr lang="en-US" b="1" dirty="0"/>
-              <a:t> repository </a:t>
-            </a:r>
-            <a:r>
-              <a:rPr lang="en-US" b="1" dirty="0" err="1"/>
-              <a:t>cho</a:t>
-            </a:r>
-            <a:r>
-              <a:rPr lang="en-US" b="1" dirty="0"/>
-              <a:t> project </a:t>
-            </a:r>
-            <a:r>
-              <a:rPr lang="en-US" b="1" dirty="0" err="1"/>
-              <a:t>mới</a:t>
-            </a:r>
-            <a:r>
-              <a:rPr lang="en-US" b="1" dirty="0"/>
-              <a:t> </a:t>
-            </a:r>
-            <a:r>
-              <a:rPr lang="en-US" b="1" dirty="0" err="1"/>
-              <a:t>trên</a:t>
-            </a:r>
-            <a:r>
-              <a:rPr lang="en-US" b="1" dirty="0"/>
-              <a:t> GitHub </a:t>
-            </a:r>
-            <a:r>
-              <a:rPr lang="en-US" dirty="0"/>
-              <a:t>	: </a:t>
-            </a:r>
-            <a:r>
-              <a:rPr lang="en-US" dirty="0">
-                <a:hlinkClick r:id="rId4"/>
-              </a:rPr>
-              <a:t>https://github.com</a:t>
-            </a:r>
-            <a:r>
-              <a:rPr lang="en-US" dirty="0"/>
-              <a:t> (</a:t>
-            </a:r>
-            <a:r>
-              <a:rPr lang="en-US" dirty="0" err="1"/>
-              <a:t>sau</a:t>
-            </a:r>
-            <a:r>
-              <a:rPr lang="en-US" dirty="0"/>
-              <a:t> </a:t>
-            </a:r>
-            <a:r>
-              <a:rPr lang="en-US" dirty="0" err="1"/>
-              <a:t>khi</a:t>
-            </a:r>
-            <a:r>
-              <a:rPr lang="en-US" dirty="0"/>
-              <a:t> </a:t>
-            </a:r>
-            <a:r>
-              <a:rPr lang="en-US" dirty="0" err="1"/>
-              <a:t>đã</a:t>
-            </a:r>
-            <a:r>
-              <a:rPr lang="en-US" dirty="0"/>
-              <a:t> </a:t>
-            </a:r>
-            <a:r>
-              <a:rPr lang="en-US" dirty="0" err="1"/>
-              <a:t>đăng</a:t>
-            </a:r>
-            <a:r>
-              <a:rPr lang="en-US" dirty="0"/>
-              <a:t> </a:t>
-            </a:r>
-            <a:r>
-              <a:rPr lang="en-US" dirty="0" err="1"/>
-              <a:t>nhập</a:t>
-            </a:r>
-            <a:r>
-              <a:rPr lang="en-US" dirty="0"/>
-              <a:t>)</a:t>
-            </a:r>
-            <a:br>
-              <a:rPr lang="en-US" dirty="0"/>
-            </a:br>
-            <a:endParaRPr lang="en-US" dirty="0"/>
-          </a:p>
-        </p:txBody>
-      </p:sp>
-      <p:sp>
-        <p:nvSpPr>
-          <p:cNvPr id="8" name="Rectangle: Rounded Corners 7">
-            <a:extLst>
-              <a:ext uri="{FF2B5EF4-FFF2-40B4-BE49-F238E27FC236}">
-                <a16:creationId xmlns:a16="http://schemas.microsoft.com/office/drawing/2014/main" xmlns="" id="{05B5A727-C75A-4A2B-A360-C70FBD15A7C5}"/>
-              </a:ext>
-            </a:extLst>
-          </p:cNvPr>
-          <p:cNvSpPr/>
-          <p:nvPr/>
-        </p:nvSpPr>
-        <p:spPr>
-          <a:xfrm>
-            <a:off x="1513449" y="5775229"/>
-            <a:ext cx="6705600" cy="701771"/>
-          </a:xfrm>
-          <a:prstGeom prst="roundRect">
-            <a:avLst/>
-          </a:prstGeom>
-        </p:spPr>
-        <p:style>
-          <a:lnRef idx="2">
-            <a:schemeClr val="accent1"/>
-          </a:lnRef>
-          <a:fillRef idx="1">
-            <a:schemeClr val="lt1"/>
-          </a:fillRef>
-          <a:effectRef idx="0">
-            <a:schemeClr val="accent1"/>
-          </a:effectRef>
-          <a:fontRef idx="minor">
-            <a:schemeClr val="dk1"/>
-          </a:fontRef>
-        </p:style>
-        <p:txBody>
-          <a:bodyPr rtlCol="0" anchor="ctr"/>
-          <a:lstStyle/>
-          <a:p>
-            <a:r>
-              <a:rPr lang="en-US" b="1" dirty="0"/>
-              <a:t>5. </a:t>
-            </a:r>
-            <a:r>
-              <a:rPr lang="en-US" b="1" dirty="0" err="1"/>
-              <a:t>Khởi</a:t>
-            </a:r>
-            <a:r>
-              <a:rPr lang="en-US" b="1" dirty="0"/>
-              <a:t> </a:t>
-            </a:r>
-            <a:r>
-              <a:rPr lang="en-US" b="1" dirty="0" err="1"/>
-              <a:t>động</a:t>
-            </a:r>
-            <a:r>
-              <a:rPr lang="en-US" b="1" dirty="0"/>
-              <a:t> </a:t>
-            </a:r>
-            <a:r>
-              <a:rPr lang="en-US" b="1" dirty="0" err="1"/>
-              <a:t>với</a:t>
-            </a:r>
-            <a:r>
-              <a:rPr lang="en-US" b="1" dirty="0"/>
-              <a:t> Git command line </a:t>
-            </a:r>
-            <a:r>
-              <a:rPr lang="en-US" dirty="0" err="1"/>
-              <a:t>trên</a:t>
-            </a:r>
-            <a:r>
-              <a:rPr lang="en-US" dirty="0"/>
-              <a:t> local</a:t>
-            </a:r>
-            <a:br>
-              <a:rPr lang="en-US" dirty="0"/>
-            </a:br>
-            <a:endParaRPr lang="en-US" dirty="0"/>
-          </a:p>
-        </p:txBody>
-      </p:sp>
-    </p:spTree>
-    <p:extLst>
-      <p:ext uri="{BB962C8B-B14F-4D97-AF65-F5344CB8AC3E}">
-        <p14:creationId xmlns:p14="http://schemas.microsoft.com/office/powerpoint/2010/main" val="3391270706"/>
-      </p:ext>
-    </p:extLst>
-  </p:cSld>
-  <p:clrMapOvr>
-    <a:masterClrMapping/>
-  </p:clrMapOvr>
-  <p:timing>
-    <p:tnLst>
-      <p:par>
-        <p:cTn id="1" dur="indefinite" restart="never" nodeType="tmRoot"/>
-      </p:par>
-    </p:tnLst>
-  </p:timing>
-</p:sld>
-</file>
-
 <file path=ppt/theme/theme1.xml><?xml version="1.0" encoding="utf-8"?>
 <a:theme xmlns:a="http://schemas.openxmlformats.org/drawingml/2006/main" name="Wood Type">
   <a:themeElements>
@@ -11548,7 +12244,7 @@
   <a:extraClrSchemeLst/>
   <a:extLst>
     <a:ext uri="{05A4C25C-085E-4340-85A3-A5531E510DB2}">
-      <thm15:themeFamily xmlns:thm15="http://schemas.microsoft.com/office/thememl/2012/main" xmlns="" name="Wood Type" id="{7ACABC62-BF99-48CF-A9DC-4DB89C7B13DC}" vid="{BE1B6DD8-9976-4550-A6F4-B2DD4EA939DA}"/>
+      <thm15:themeFamily xmlns="" xmlns:thm15="http://schemas.microsoft.com/office/thememl/2012/main" name="Wood Type" id="{7ACABC62-BF99-48CF-A9DC-4DB89C7B13DC}" vid="{BE1B6DD8-9976-4550-A6F4-B2DD4EA939DA}"/>
     </a:ext>
   </a:extLst>
 </a:theme>

</xml_diff>